<commit_message>
finished sample pre-preprocessing onto last video
</commit_message>
<xml_diff>
--- a/CSI 758 Project Spring 2017 Bruce Goldfeder.pptx
+++ b/CSI 758 Project Spring 2017 Bruce Goldfeder.pptx
@@ -7,6 +7,8 @@
   <p:sldIdLst>
     <p:sldId id="256" r:id="rId2"/>
     <p:sldId id="257" r:id="rId3"/>
+    <p:sldId id="258" r:id="rId4"/>
+    <p:sldId id="259" r:id="rId5"/>
   </p:sldIdLst>
   <p:sldSz cx="12192000" cy="6858000"/>
   <p:notesSz cx="6858000" cy="9144000"/>
@@ -105,7 +107,16 @@
       </a:defRPr>
     </a:lvl9pPr>
   </p:defaultTextStyle>
+  <p:extLst>
+    <p:ext uri="{EFAFB233-063F-42B5-8137-9DF3F51BA10A}">
+      <p15:sldGuideLst xmlns:p15="http://schemas.microsoft.com/office/powerpoint/2012/main"/>
+    </p:ext>
+  </p:extLst>
 </p:presentation>
+</file>
+
+<file path=ppt/revisionInfo.xml><?xml version="1.0" encoding="utf-8"?>
+<p1510:revInfo xmlns:a="http://schemas.openxmlformats.org/drawingml/2006/main" xmlns:r="http://schemas.openxmlformats.org/officeDocument/2006/relationships" xmlns:p1510="http://schemas.microsoft.com/office/powerpoint/2015/10/main"/>
 </file>
 
 <file path=ppt/slideLayouts/slideLayout1.xml><?xml version="1.0" encoding="utf-8"?>
@@ -444,7 +455,7 @@
             <a:fld id="{5923F103-BC34-4FE4-A40E-EDDEECFDA5D0}" type="datetimeFigureOut">
               <a:rPr lang="en-US" dirty="0"/>
               <a:pPr/>
-              <a:t>5/2/2017</a:t>
+              <a:t>5/3/2017</a:t>
             </a:fld>
             <a:endParaRPr lang="en-US" dirty="0"/>
           </a:p>
@@ -1532,7 +1543,7 @@
           <a:p>
             <a:fld id="{923A1CC3-2375-41D4-9E03-427CAF2A4C1A}" type="datetimeFigureOut">
               <a:rPr lang="en-US" dirty="0"/>
-              <a:t>5/2/2017</a:t>
+              <a:t>5/3/2017</a:t>
             </a:fld>
             <a:endParaRPr lang="en-US" dirty="0"/>
           </a:p>
@@ -2512,7 +2523,7 @@
           <a:p>
             <a:fld id="{AFF16868-8199-4C2C-A5B1-63AEE139F88E}" type="datetimeFigureOut">
               <a:rPr lang="en-US" dirty="0"/>
-              <a:t>5/2/2017</a:t>
+              <a:t>5/3/2017</a:t>
             </a:fld>
             <a:endParaRPr lang="en-US" dirty="0"/>
           </a:p>
@@ -3646,7 +3657,7 @@
           <a:p>
             <a:fld id="{AAD9FF7F-6988-44CC-821B-644E70CD2F73}" type="datetimeFigureOut">
               <a:rPr lang="en-US" dirty="0"/>
-              <a:t>5/2/2017</a:t>
+              <a:t>5/3/2017</a:t>
             </a:fld>
             <a:endParaRPr lang="en-US" dirty="0"/>
           </a:p>
@@ -4679,7 +4690,7 @@
           <a:p>
             <a:fld id="{5C12C299-16B2-4475-990D-751901EACC14}" type="datetimeFigureOut">
               <a:rPr lang="en-US" dirty="0"/>
-              <a:t>5/2/2017</a:t>
+              <a:t>5/3/2017</a:t>
             </a:fld>
             <a:endParaRPr lang="en-US" dirty="0"/>
           </a:p>
@@ -5339,7 +5350,7 @@
           <a:p>
             <a:fld id="{9FE86839-B9D8-4651-8783-F325ECE74E65}" type="datetimeFigureOut">
               <a:rPr lang="en-US" dirty="0"/>
-              <a:t>5/2/2017</a:t>
+              <a:t>5/3/2017</a:t>
             </a:fld>
             <a:endParaRPr lang="en-US" dirty="0"/>
           </a:p>
@@ -6200,7 +6211,7 @@
           <a:p>
             <a:fld id="{FD484F64-32F6-45C5-931F-ADC1662401D0}" type="datetimeFigureOut">
               <a:rPr lang="en-US" dirty="0"/>
-              <a:t>5/2/2017</a:t>
+              <a:t>5/3/2017</a:t>
             </a:fld>
             <a:endParaRPr lang="en-US" dirty="0"/>
           </a:p>
@@ -6390,7 +6401,7 @@
           <a:p>
             <a:fld id="{53086D93-FCAC-47E0-A2EE-787E62CA814C}" type="datetimeFigureOut">
               <a:rPr lang="en-US" dirty="0"/>
-              <a:t>5/2/2017</a:t>
+              <a:t>5/3/2017</a:t>
             </a:fld>
             <a:endParaRPr lang="en-US" dirty="0"/>
           </a:p>
@@ -7362,7 +7373,7 @@
           <a:p>
             <a:fld id="{CDA879A6-0FD0-4734-A311-86BFCA472E6E}" type="datetimeFigureOut">
               <a:rPr lang="en-US" dirty="0"/>
-              <a:t>5/2/2017</a:t>
+              <a:t>5/3/2017</a:t>
             </a:fld>
             <a:endParaRPr lang="en-US" dirty="0"/>
           </a:p>
@@ -7573,7 +7584,7 @@
           <a:p>
             <a:fld id="{19C9CA7B-DFD4-44B5-8C60-D14B8CD1FB59}" type="datetimeFigureOut">
               <a:rPr lang="en-US" dirty="0"/>
-              <a:t>5/2/2017</a:t>
+              <a:t>5/3/2017</a:t>
             </a:fld>
             <a:endParaRPr lang="en-US" dirty="0"/>
           </a:p>
@@ -8607,7 +8618,7 @@
           <a:p>
             <a:fld id="{F34E6425-0181-43F2-84FC-787E803FD2F8}" type="datetimeFigureOut">
               <a:rPr lang="en-US" dirty="0"/>
-              <a:t>5/2/2017</a:t>
+              <a:t>5/3/2017</a:t>
             </a:fld>
             <a:endParaRPr lang="en-US" dirty="0"/>
           </a:p>
@@ -8879,7 +8890,7 @@
           <a:p>
             <a:fld id="{3BDB8791-F1B0-41E7-B7FD-A781E65C4266}" type="datetimeFigureOut">
               <a:rPr lang="en-US" dirty="0"/>
-              <a:t>5/2/2017</a:t>
+              <a:t>5/3/2017</a:t>
             </a:fld>
             <a:endParaRPr lang="en-US" dirty="0"/>
           </a:p>
@@ -9289,7 +9300,7 @@
           <a:p>
             <a:fld id="{5FDD63B2-E120-4ED8-B27B-C685F510A5FE}" type="datetimeFigureOut">
               <a:rPr lang="en-US" dirty="0"/>
-              <a:t>5/2/2017</a:t>
+              <a:t>5/3/2017</a:t>
             </a:fld>
             <a:endParaRPr lang="en-US" dirty="0"/>
           </a:p>
@@ -9416,7 +9427,7 @@
           <a:p>
             <a:fld id="{7AA18ACC-A947-437B-A130-35BD54FDF1E9}" type="datetimeFigureOut">
               <a:rPr lang="en-US" dirty="0"/>
-              <a:t>5/2/2017</a:t>
+              <a:t>5/3/2017</a:t>
             </a:fld>
             <a:endParaRPr lang="en-US" dirty="0"/>
           </a:p>
@@ -9511,7 +9522,7 @@
           <a:p>
             <a:fld id="{7C8D7E02-BCB8-4D50-A234-369438C08659}" type="datetimeFigureOut">
               <a:rPr lang="en-US" dirty="0"/>
-              <a:t>5/2/2017</a:t>
+              <a:t>5/3/2017</a:t>
             </a:fld>
             <a:endParaRPr lang="en-US" dirty="0"/>
           </a:p>
@@ -10592,7 +10603,7 @@
           <a:p>
             <a:fld id="{76E86A4C-8E40-4F87-A4F0-01A0687C5742}" type="datetimeFigureOut">
               <a:rPr lang="en-US" dirty="0"/>
-              <a:t>5/2/2017</a:t>
+              <a:t>5/3/2017</a:t>
             </a:fld>
             <a:endParaRPr lang="en-US" dirty="0"/>
           </a:p>
@@ -11700,7 +11711,7 @@
           <a:p>
             <a:fld id="{35E72C73-2D91-4E12-BA25-F0AA0C03599B}" type="datetimeFigureOut">
               <a:rPr lang="en-US" dirty="0"/>
-              <a:t>5/2/2017</a:t>
+              <a:t>5/3/2017</a:t>
             </a:fld>
             <a:endParaRPr lang="en-US" dirty="0"/>
           </a:p>
@@ -12697,7 +12708,7 @@
           <a:p>
             <a:fld id="{2BE451C3-0FF4-47C4-B829-773ADF60F88C}" type="datetimeFigureOut">
               <a:rPr lang="en-US" dirty="0"/>
-              <a:t>5/2/2017</a:t>
+              <a:t>5/3/2017</a:t>
             </a:fld>
             <a:endParaRPr lang="en-US" dirty="0"/>
           </a:p>
@@ -13407,9 +13418,16 @@
             <p:ph idx="1"/>
           </p:nvPr>
         </p:nvSpPr>
-        <p:spPr/>
+        <p:spPr>
+          <a:xfrm>
+            <a:off x="615459" y="2704387"/>
+            <a:ext cx="6699742" cy="3416300"/>
+          </a:xfrm>
+        </p:spPr>
         <p:txBody>
-          <a:bodyPr/>
+          <a:bodyPr>
+            <a:normAutofit lnSpcReduction="10000"/>
+          </a:bodyPr>
           <a:lstStyle/>
           <a:p>
             <a:r>
@@ -13427,7 +13445,15 @@
             <a:pPr lvl="1"/>
             <a:r>
               <a:rPr lang="en-US" dirty="0"/>
-              <a:t>Sample set of 20 images, Stage1(70GB), Stage2(40GB)</a:t>
+              <a:t>Sample set of 20 </a:t>
+            </a:r>
+            <a:r>
+              <a:rPr lang="en-US" dirty="0" err="1"/>
+              <a:t>Dicom</a:t>
+            </a:r>
+            <a:r>
+              <a:rPr lang="en-US" dirty="0"/>
+              <a:t>, Stage1(70GB), Stage2(40GB)</a:t>
             </a:r>
           </a:p>
           <a:p>
@@ -13463,6 +13489,986 @@
               <a:rPr lang="en-US" dirty="0"/>
               <a:t>Subset of patients identified to be used as training set</a:t>
             </a:r>
+          </a:p>
+        </p:txBody>
+      </p:sp>
+      <p:graphicFrame>
+        <p:nvGraphicFramePr>
+          <p:cNvPr id="5" name="Table 4"/>
+          <p:cNvGraphicFramePr>
+            <a:graphicFrameLocks noGrp="1"/>
+          </p:cNvGraphicFramePr>
+          <p:nvPr>
+            <p:extLst>
+              <p:ext uri="{D42A27DB-BD31-4B8C-83A1-F6EECF244321}">
+                <p14:modId xmlns:p14="http://schemas.microsoft.com/office/powerpoint/2010/main" val="1565510977"/>
+              </p:ext>
+            </p:extLst>
+          </p:nvPr>
+        </p:nvGraphicFramePr>
+        <p:xfrm>
+          <a:off x="8513064" y="4712462"/>
+          <a:ext cx="3113976" cy="2026920"/>
+        </p:xfrm>
+        <a:graphic>
+          <a:graphicData uri="http://schemas.openxmlformats.org/drawingml/2006/table">
+            <a:tbl>
+              <a:tblPr/>
+              <a:tblGrid>
+                <a:gridCol w="1556988">
+                  <a:extLst>
+                    <a:ext uri="{9D8B030D-6E8A-4147-A177-3AD203B41FA5}">
+                      <a16:colId xmlns:a16="http://schemas.microsoft.com/office/drawing/2014/main" val="3328714152"/>
+                    </a:ext>
+                  </a:extLst>
+                </a:gridCol>
+                <a:gridCol w="1556988">
+                  <a:extLst>
+                    <a:ext uri="{9D8B030D-6E8A-4147-A177-3AD203B41FA5}">
+                      <a16:colId xmlns:a16="http://schemas.microsoft.com/office/drawing/2014/main" val="2061798104"/>
+                    </a:ext>
+                  </a:extLst>
+                </a:gridCol>
+              </a:tblGrid>
+              <a:tr h="208570">
+                <a:tc>
+                  <a:txBody>
+                    <a:bodyPr/>
+                    <a:lstStyle/>
+                    <a:p>
+                      <a:pPr algn="l" fontAlgn="ctr"/>
+                      <a:r>
+                        <a:rPr lang="en-US" sz="1200" b="1" dirty="0">
+                          <a:effectLst/>
+                        </a:rPr>
+                        <a:t>id</a:t>
+                      </a:r>
+                    </a:p>
+                  </a:txBody>
+                  <a:tcPr marL="38100" marR="38100" marT="38100" marB="38100" anchor="ctr">
+                    <a:lnL w="9525" cap="flat" cmpd="sng" algn="ctr">
+                      <a:solidFill>
+                        <a:srgbClr val="000000"/>
+                      </a:solidFill>
+                      <a:prstDash val="solid"/>
+                      <a:round/>
+                      <a:headEnd type="none" w="med" len="med"/>
+                      <a:tailEnd type="none" w="med" len="med"/>
+                    </a:lnL>
+                    <a:lnR w="9525" cap="flat" cmpd="sng" algn="ctr">
+                      <a:solidFill>
+                        <a:srgbClr val="000000"/>
+                      </a:solidFill>
+                      <a:prstDash val="solid"/>
+                      <a:round/>
+                      <a:headEnd type="none" w="med" len="med"/>
+                      <a:tailEnd type="none" w="med" len="med"/>
+                    </a:lnR>
+                    <a:lnT w="9525" cap="flat" cmpd="sng" algn="ctr">
+                      <a:solidFill>
+                        <a:srgbClr val="000000"/>
+                      </a:solidFill>
+                      <a:prstDash val="solid"/>
+                      <a:round/>
+                      <a:headEnd type="none" w="med" len="med"/>
+                      <a:tailEnd type="none" w="med" len="med"/>
+                    </a:lnT>
+                    <a:lnB w="9525" cap="flat" cmpd="sng" algn="ctr">
+                      <a:solidFill>
+                        <a:srgbClr val="000000"/>
+                      </a:solidFill>
+                      <a:prstDash val="solid"/>
+                      <a:round/>
+                      <a:headEnd type="none" w="med" len="med"/>
+                      <a:tailEnd type="none" w="med" len="med"/>
+                    </a:lnB>
+                    <a:solidFill>
+                      <a:srgbClr val="FFFFFF"/>
+                    </a:solidFill>
+                  </a:tcPr>
+                </a:tc>
+                <a:tc>
+                  <a:txBody>
+                    <a:bodyPr/>
+                    <a:lstStyle/>
+                    <a:p>
+                      <a:pPr algn="l" fontAlgn="ctr"/>
+                      <a:r>
+                        <a:rPr lang="en-US" sz="1200" b="1" dirty="0">
+                          <a:effectLst/>
+                        </a:rPr>
+                        <a:t>cancer</a:t>
+                      </a:r>
+                    </a:p>
+                  </a:txBody>
+                  <a:tcPr marL="38100" marR="38100" marT="38100" marB="38100" anchor="ctr">
+                    <a:lnL w="9525" cap="flat" cmpd="sng" algn="ctr">
+                      <a:solidFill>
+                        <a:srgbClr val="000000"/>
+                      </a:solidFill>
+                      <a:prstDash val="solid"/>
+                      <a:round/>
+                      <a:headEnd type="none" w="med" len="med"/>
+                      <a:tailEnd type="none" w="med" len="med"/>
+                    </a:lnL>
+                    <a:lnR w="9525" cap="flat" cmpd="sng" algn="ctr">
+                      <a:solidFill>
+                        <a:srgbClr val="000000"/>
+                      </a:solidFill>
+                      <a:prstDash val="solid"/>
+                      <a:round/>
+                      <a:headEnd type="none" w="med" len="med"/>
+                      <a:tailEnd type="none" w="med" len="med"/>
+                    </a:lnR>
+                    <a:lnT w="9525" cap="flat" cmpd="sng" algn="ctr">
+                      <a:solidFill>
+                        <a:srgbClr val="000000"/>
+                      </a:solidFill>
+                      <a:prstDash val="solid"/>
+                      <a:round/>
+                      <a:headEnd type="none" w="med" len="med"/>
+                      <a:tailEnd type="none" w="med" len="med"/>
+                    </a:lnT>
+                    <a:lnB w="9525" cap="flat" cmpd="sng" algn="ctr">
+                      <a:solidFill>
+                        <a:srgbClr val="000000"/>
+                      </a:solidFill>
+                      <a:prstDash val="solid"/>
+                      <a:round/>
+                      <a:headEnd type="none" w="med" len="med"/>
+                      <a:tailEnd type="none" w="med" len="med"/>
+                    </a:lnB>
+                    <a:solidFill>
+                      <a:srgbClr val="FFFFFF"/>
+                    </a:solidFill>
+                  </a:tcPr>
+                </a:tc>
+                <a:extLst>
+                  <a:ext uri="{0D108BD9-81ED-4DB2-BD59-A6C34878D82A}">
+                    <a16:rowId xmlns:a16="http://schemas.microsoft.com/office/drawing/2014/main" val="1918670747"/>
+                  </a:ext>
+                </a:extLst>
+              </a:tr>
+              <a:tr h="355796">
+                <a:tc>
+                  <a:txBody>
+                    <a:bodyPr/>
+                    <a:lstStyle/>
+                    <a:p>
+                      <a:pPr algn="l" fontAlgn="ctr"/>
+                      <a:r>
+                        <a:rPr lang="en-US" sz="1200" b="1" dirty="0">
+                          <a:effectLst/>
+                        </a:rPr>
+                        <a:t>0015ceb851d7251b8f399e39779d1e7d</a:t>
+                      </a:r>
+                    </a:p>
+                  </a:txBody>
+                  <a:tcPr marL="38100" marR="38100" marT="38100" marB="38100" anchor="ctr">
+                    <a:lnL w="9525" cap="flat" cmpd="sng" algn="ctr">
+                      <a:solidFill>
+                        <a:srgbClr val="000000"/>
+                      </a:solidFill>
+                      <a:prstDash val="solid"/>
+                      <a:round/>
+                      <a:headEnd type="none" w="med" len="med"/>
+                      <a:tailEnd type="none" w="med" len="med"/>
+                    </a:lnL>
+                    <a:lnR w="9525" cap="flat" cmpd="sng" algn="ctr">
+                      <a:solidFill>
+                        <a:srgbClr val="000000"/>
+                      </a:solidFill>
+                      <a:prstDash val="solid"/>
+                      <a:round/>
+                      <a:headEnd type="none" w="med" len="med"/>
+                      <a:tailEnd type="none" w="med" len="med"/>
+                    </a:lnR>
+                    <a:lnT w="9525" cap="flat" cmpd="sng" algn="ctr">
+                      <a:solidFill>
+                        <a:srgbClr val="000000"/>
+                      </a:solidFill>
+                      <a:prstDash val="solid"/>
+                      <a:round/>
+                      <a:headEnd type="none" w="med" len="med"/>
+                      <a:tailEnd type="none" w="med" len="med"/>
+                    </a:lnT>
+                    <a:lnB w="9525" cap="flat" cmpd="sng" algn="ctr">
+                      <a:solidFill>
+                        <a:srgbClr val="000000"/>
+                      </a:solidFill>
+                      <a:prstDash val="solid"/>
+                      <a:round/>
+                      <a:headEnd type="none" w="med" len="med"/>
+                      <a:tailEnd type="none" w="med" len="med"/>
+                    </a:lnB>
+                    <a:solidFill>
+                      <a:srgbClr val="FFFFFF"/>
+                    </a:solidFill>
+                  </a:tcPr>
+                </a:tc>
+                <a:tc>
+                  <a:txBody>
+                    <a:bodyPr/>
+                    <a:lstStyle/>
+                    <a:p>
+                      <a:pPr algn="l" fontAlgn="ctr"/>
+                      <a:r>
+                        <a:rPr lang="en-US" sz="1200" dirty="0">
+                          <a:effectLst/>
+                        </a:rPr>
+                        <a:t>1</a:t>
+                      </a:r>
+                    </a:p>
+                  </a:txBody>
+                  <a:tcPr marL="38100" marR="38100" marT="38100" marB="38100" anchor="ctr">
+                    <a:lnL w="9525" cap="flat" cmpd="sng" algn="ctr">
+                      <a:solidFill>
+                        <a:srgbClr val="000000"/>
+                      </a:solidFill>
+                      <a:prstDash val="solid"/>
+                      <a:round/>
+                      <a:headEnd type="none" w="med" len="med"/>
+                      <a:tailEnd type="none" w="med" len="med"/>
+                    </a:lnL>
+                    <a:lnR w="9525" cap="flat" cmpd="sng" algn="ctr">
+                      <a:solidFill>
+                        <a:srgbClr val="000000"/>
+                      </a:solidFill>
+                      <a:prstDash val="solid"/>
+                      <a:round/>
+                      <a:headEnd type="none" w="med" len="med"/>
+                      <a:tailEnd type="none" w="med" len="med"/>
+                    </a:lnR>
+                    <a:lnT w="9525" cap="flat" cmpd="sng" algn="ctr">
+                      <a:solidFill>
+                        <a:srgbClr val="000000"/>
+                      </a:solidFill>
+                      <a:prstDash val="solid"/>
+                      <a:round/>
+                      <a:headEnd type="none" w="med" len="med"/>
+                      <a:tailEnd type="none" w="med" len="med"/>
+                    </a:lnT>
+                    <a:lnB w="9525" cap="flat" cmpd="sng" algn="ctr">
+                      <a:solidFill>
+                        <a:srgbClr val="000000"/>
+                      </a:solidFill>
+                      <a:prstDash val="solid"/>
+                      <a:round/>
+                      <a:headEnd type="none" w="med" len="med"/>
+                      <a:tailEnd type="none" w="med" len="med"/>
+                    </a:lnB>
+                    <a:solidFill>
+                      <a:srgbClr val="FFFFFF"/>
+                    </a:solidFill>
+                  </a:tcPr>
+                </a:tc>
+                <a:extLst>
+                  <a:ext uri="{0D108BD9-81ED-4DB2-BD59-A6C34878D82A}">
+                    <a16:rowId xmlns:a16="http://schemas.microsoft.com/office/drawing/2014/main" val="3198081074"/>
+                  </a:ext>
+                </a:extLst>
+              </a:tr>
+              <a:tr h="355796">
+                <a:tc>
+                  <a:txBody>
+                    <a:bodyPr/>
+                    <a:lstStyle/>
+                    <a:p>
+                      <a:pPr algn="l" fontAlgn="ctr"/>
+                      <a:r>
+                        <a:rPr lang="en-US" sz="1200" b="1">
+                          <a:effectLst/>
+                        </a:rPr>
+                        <a:t>0030a160d58723ff36d73f41b170ec21</a:t>
+                      </a:r>
+                    </a:p>
+                  </a:txBody>
+                  <a:tcPr marL="38100" marR="38100" marT="38100" marB="38100" anchor="ctr">
+                    <a:lnL w="9525" cap="flat" cmpd="sng" algn="ctr">
+                      <a:solidFill>
+                        <a:srgbClr val="000000"/>
+                      </a:solidFill>
+                      <a:prstDash val="solid"/>
+                      <a:round/>
+                      <a:headEnd type="none" w="med" len="med"/>
+                      <a:tailEnd type="none" w="med" len="med"/>
+                    </a:lnL>
+                    <a:lnR w="9525" cap="flat" cmpd="sng" algn="ctr">
+                      <a:solidFill>
+                        <a:srgbClr val="000000"/>
+                      </a:solidFill>
+                      <a:prstDash val="solid"/>
+                      <a:round/>
+                      <a:headEnd type="none" w="med" len="med"/>
+                      <a:tailEnd type="none" w="med" len="med"/>
+                    </a:lnR>
+                    <a:lnT w="9525" cap="flat" cmpd="sng" algn="ctr">
+                      <a:solidFill>
+                        <a:srgbClr val="000000"/>
+                      </a:solidFill>
+                      <a:prstDash val="solid"/>
+                      <a:round/>
+                      <a:headEnd type="none" w="med" len="med"/>
+                      <a:tailEnd type="none" w="med" len="med"/>
+                    </a:lnT>
+                    <a:lnB w="9525" cap="flat" cmpd="sng" algn="ctr">
+                      <a:solidFill>
+                        <a:srgbClr val="000000"/>
+                      </a:solidFill>
+                      <a:prstDash val="solid"/>
+                      <a:round/>
+                      <a:headEnd type="none" w="med" len="med"/>
+                      <a:tailEnd type="none" w="med" len="med"/>
+                    </a:lnB>
+                    <a:solidFill>
+                      <a:srgbClr val="FFFFFF"/>
+                    </a:solidFill>
+                  </a:tcPr>
+                </a:tc>
+                <a:tc>
+                  <a:txBody>
+                    <a:bodyPr/>
+                    <a:lstStyle/>
+                    <a:p>
+                      <a:pPr algn="l" fontAlgn="ctr"/>
+                      <a:r>
+                        <a:rPr lang="en-US" sz="1200" dirty="0">
+                          <a:effectLst/>
+                        </a:rPr>
+                        <a:t>0</a:t>
+                      </a:r>
+                    </a:p>
+                  </a:txBody>
+                  <a:tcPr marL="38100" marR="38100" marT="38100" marB="38100" anchor="ctr">
+                    <a:lnL w="9525" cap="flat" cmpd="sng" algn="ctr">
+                      <a:solidFill>
+                        <a:srgbClr val="000000"/>
+                      </a:solidFill>
+                      <a:prstDash val="solid"/>
+                      <a:round/>
+                      <a:headEnd type="none" w="med" len="med"/>
+                      <a:tailEnd type="none" w="med" len="med"/>
+                    </a:lnL>
+                    <a:lnR w="9525" cap="flat" cmpd="sng" algn="ctr">
+                      <a:solidFill>
+                        <a:srgbClr val="000000"/>
+                      </a:solidFill>
+                      <a:prstDash val="solid"/>
+                      <a:round/>
+                      <a:headEnd type="none" w="med" len="med"/>
+                      <a:tailEnd type="none" w="med" len="med"/>
+                    </a:lnR>
+                    <a:lnT w="9525" cap="flat" cmpd="sng" algn="ctr">
+                      <a:solidFill>
+                        <a:srgbClr val="000000"/>
+                      </a:solidFill>
+                      <a:prstDash val="solid"/>
+                      <a:round/>
+                      <a:headEnd type="none" w="med" len="med"/>
+                      <a:tailEnd type="none" w="med" len="med"/>
+                    </a:lnT>
+                    <a:lnB w="9525" cap="flat" cmpd="sng" algn="ctr">
+                      <a:solidFill>
+                        <a:srgbClr val="000000"/>
+                      </a:solidFill>
+                      <a:prstDash val="solid"/>
+                      <a:round/>
+                      <a:headEnd type="none" w="med" len="med"/>
+                      <a:tailEnd type="none" w="med" len="med"/>
+                    </a:lnB>
+                    <a:solidFill>
+                      <a:srgbClr val="FFFFFF"/>
+                    </a:solidFill>
+                  </a:tcPr>
+                </a:tc>
+                <a:extLst>
+                  <a:ext uri="{0D108BD9-81ED-4DB2-BD59-A6C34878D82A}">
+                    <a16:rowId xmlns:a16="http://schemas.microsoft.com/office/drawing/2014/main" val="597217677"/>
+                  </a:ext>
+                </a:extLst>
+              </a:tr>
+              <a:tr h="355796">
+                <a:tc>
+                  <a:txBody>
+                    <a:bodyPr/>
+                    <a:lstStyle/>
+                    <a:p>
+                      <a:pPr algn="l" fontAlgn="ctr"/>
+                      <a:r>
+                        <a:rPr lang="en-US" sz="1200" b="1">
+                          <a:effectLst/>
+                        </a:rPr>
+                        <a:t>003f41c78e6acfa92430a057ac0b306e</a:t>
+                      </a:r>
+                    </a:p>
+                  </a:txBody>
+                  <a:tcPr marL="38100" marR="38100" marT="38100" marB="38100" anchor="ctr">
+                    <a:lnL w="9525" cap="flat" cmpd="sng" algn="ctr">
+                      <a:solidFill>
+                        <a:srgbClr val="000000"/>
+                      </a:solidFill>
+                      <a:prstDash val="solid"/>
+                      <a:round/>
+                      <a:headEnd type="none" w="med" len="med"/>
+                      <a:tailEnd type="none" w="med" len="med"/>
+                    </a:lnL>
+                    <a:lnR w="9525" cap="flat" cmpd="sng" algn="ctr">
+                      <a:solidFill>
+                        <a:srgbClr val="000000"/>
+                      </a:solidFill>
+                      <a:prstDash val="solid"/>
+                      <a:round/>
+                      <a:headEnd type="none" w="med" len="med"/>
+                      <a:tailEnd type="none" w="med" len="med"/>
+                    </a:lnR>
+                    <a:lnT w="9525" cap="flat" cmpd="sng" algn="ctr">
+                      <a:solidFill>
+                        <a:srgbClr val="000000"/>
+                      </a:solidFill>
+                      <a:prstDash val="solid"/>
+                      <a:round/>
+                      <a:headEnd type="none" w="med" len="med"/>
+                      <a:tailEnd type="none" w="med" len="med"/>
+                    </a:lnT>
+                    <a:lnB w="9525" cap="flat" cmpd="sng" algn="ctr">
+                      <a:solidFill>
+                        <a:srgbClr val="000000"/>
+                      </a:solidFill>
+                      <a:prstDash val="solid"/>
+                      <a:round/>
+                      <a:headEnd type="none" w="med" len="med"/>
+                      <a:tailEnd type="none" w="med" len="med"/>
+                    </a:lnB>
+                    <a:solidFill>
+                      <a:srgbClr val="FFFFFF"/>
+                    </a:solidFill>
+                  </a:tcPr>
+                </a:tc>
+                <a:tc>
+                  <a:txBody>
+                    <a:bodyPr/>
+                    <a:lstStyle/>
+                    <a:p>
+                      <a:pPr algn="l" fontAlgn="ctr"/>
+                      <a:r>
+                        <a:rPr lang="en-US" sz="1200">
+                          <a:effectLst/>
+                        </a:rPr>
+                        <a:t>0</a:t>
+                      </a:r>
+                    </a:p>
+                  </a:txBody>
+                  <a:tcPr marL="38100" marR="38100" marT="38100" marB="38100" anchor="ctr">
+                    <a:lnL w="9525" cap="flat" cmpd="sng" algn="ctr">
+                      <a:solidFill>
+                        <a:srgbClr val="000000"/>
+                      </a:solidFill>
+                      <a:prstDash val="solid"/>
+                      <a:round/>
+                      <a:headEnd type="none" w="med" len="med"/>
+                      <a:tailEnd type="none" w="med" len="med"/>
+                    </a:lnL>
+                    <a:lnR w="9525" cap="flat" cmpd="sng" algn="ctr">
+                      <a:solidFill>
+                        <a:srgbClr val="000000"/>
+                      </a:solidFill>
+                      <a:prstDash val="solid"/>
+                      <a:round/>
+                      <a:headEnd type="none" w="med" len="med"/>
+                      <a:tailEnd type="none" w="med" len="med"/>
+                    </a:lnR>
+                    <a:lnT w="9525" cap="flat" cmpd="sng" algn="ctr">
+                      <a:solidFill>
+                        <a:srgbClr val="000000"/>
+                      </a:solidFill>
+                      <a:prstDash val="solid"/>
+                      <a:round/>
+                      <a:headEnd type="none" w="med" len="med"/>
+                      <a:tailEnd type="none" w="med" len="med"/>
+                    </a:lnT>
+                    <a:lnB w="9525" cap="flat" cmpd="sng" algn="ctr">
+                      <a:solidFill>
+                        <a:srgbClr val="000000"/>
+                      </a:solidFill>
+                      <a:prstDash val="solid"/>
+                      <a:round/>
+                      <a:headEnd type="none" w="med" len="med"/>
+                      <a:tailEnd type="none" w="med" len="med"/>
+                    </a:lnB>
+                    <a:solidFill>
+                      <a:srgbClr val="FFFFFF"/>
+                    </a:solidFill>
+                  </a:tcPr>
+                </a:tc>
+                <a:extLst>
+                  <a:ext uri="{0D108BD9-81ED-4DB2-BD59-A6C34878D82A}">
+                    <a16:rowId xmlns:a16="http://schemas.microsoft.com/office/drawing/2014/main" val="2162820340"/>
+                  </a:ext>
+                </a:extLst>
+              </a:tr>
+              <a:tr h="355796">
+                <a:tc>
+                  <a:txBody>
+                    <a:bodyPr/>
+                    <a:lstStyle/>
+                    <a:p>
+                      <a:pPr algn="l" fontAlgn="ctr"/>
+                      <a:r>
+                        <a:rPr lang="en-US" sz="1200" b="1">
+                          <a:effectLst/>
+                        </a:rPr>
+                        <a:t>006b96310a37b36cccb2ab48d10b49a3</a:t>
+                      </a:r>
+                    </a:p>
+                  </a:txBody>
+                  <a:tcPr marL="38100" marR="38100" marT="38100" marB="38100" anchor="ctr">
+                    <a:lnL w="9525" cap="flat" cmpd="sng" algn="ctr">
+                      <a:solidFill>
+                        <a:srgbClr val="000000"/>
+                      </a:solidFill>
+                      <a:prstDash val="solid"/>
+                      <a:round/>
+                      <a:headEnd type="none" w="med" len="med"/>
+                      <a:tailEnd type="none" w="med" len="med"/>
+                    </a:lnL>
+                    <a:lnR w="9525" cap="flat" cmpd="sng" algn="ctr">
+                      <a:solidFill>
+                        <a:srgbClr val="000000"/>
+                      </a:solidFill>
+                      <a:prstDash val="solid"/>
+                      <a:round/>
+                      <a:headEnd type="none" w="med" len="med"/>
+                      <a:tailEnd type="none" w="med" len="med"/>
+                    </a:lnR>
+                    <a:lnT w="9525" cap="flat" cmpd="sng" algn="ctr">
+                      <a:solidFill>
+                        <a:srgbClr val="000000"/>
+                      </a:solidFill>
+                      <a:prstDash val="solid"/>
+                      <a:round/>
+                      <a:headEnd type="none" w="med" len="med"/>
+                      <a:tailEnd type="none" w="med" len="med"/>
+                    </a:lnT>
+                    <a:lnB w="9525" cap="flat" cmpd="sng" algn="ctr">
+                      <a:solidFill>
+                        <a:srgbClr val="000000"/>
+                      </a:solidFill>
+                      <a:prstDash val="solid"/>
+                      <a:round/>
+                      <a:headEnd type="none" w="med" len="med"/>
+                      <a:tailEnd type="none" w="med" len="med"/>
+                    </a:lnB>
+                    <a:solidFill>
+                      <a:srgbClr val="FFFFFF"/>
+                    </a:solidFill>
+                  </a:tcPr>
+                </a:tc>
+                <a:tc>
+                  <a:txBody>
+                    <a:bodyPr/>
+                    <a:lstStyle/>
+                    <a:p>
+                      <a:pPr algn="l" fontAlgn="ctr"/>
+                      <a:r>
+                        <a:rPr lang="en-US" sz="1200" dirty="0">
+                          <a:effectLst/>
+                        </a:rPr>
+                        <a:t>1</a:t>
+                      </a:r>
+                    </a:p>
+                  </a:txBody>
+                  <a:tcPr marL="38100" marR="38100" marT="38100" marB="38100" anchor="ctr">
+                    <a:lnL w="9525" cap="flat" cmpd="sng" algn="ctr">
+                      <a:solidFill>
+                        <a:srgbClr val="000000"/>
+                      </a:solidFill>
+                      <a:prstDash val="solid"/>
+                      <a:round/>
+                      <a:headEnd type="none" w="med" len="med"/>
+                      <a:tailEnd type="none" w="med" len="med"/>
+                    </a:lnL>
+                    <a:lnR w="9525" cap="flat" cmpd="sng" algn="ctr">
+                      <a:solidFill>
+                        <a:srgbClr val="000000"/>
+                      </a:solidFill>
+                      <a:prstDash val="solid"/>
+                      <a:round/>
+                      <a:headEnd type="none" w="med" len="med"/>
+                      <a:tailEnd type="none" w="med" len="med"/>
+                    </a:lnR>
+                    <a:lnT w="9525" cap="flat" cmpd="sng" algn="ctr">
+                      <a:solidFill>
+                        <a:srgbClr val="000000"/>
+                      </a:solidFill>
+                      <a:prstDash val="solid"/>
+                      <a:round/>
+                      <a:headEnd type="none" w="med" len="med"/>
+                      <a:tailEnd type="none" w="med" len="med"/>
+                    </a:lnT>
+                    <a:lnB w="9525" cap="flat" cmpd="sng" algn="ctr">
+                      <a:solidFill>
+                        <a:srgbClr val="000000"/>
+                      </a:solidFill>
+                      <a:prstDash val="solid"/>
+                      <a:round/>
+                      <a:headEnd type="none" w="med" len="med"/>
+                      <a:tailEnd type="none" w="med" len="med"/>
+                    </a:lnB>
+                    <a:solidFill>
+                      <a:srgbClr val="FFFFFF"/>
+                    </a:solidFill>
+                  </a:tcPr>
+                </a:tc>
+                <a:extLst>
+                  <a:ext uri="{0D108BD9-81ED-4DB2-BD59-A6C34878D82A}">
+                    <a16:rowId xmlns:a16="http://schemas.microsoft.com/office/drawing/2014/main" val="1158082648"/>
+                  </a:ext>
+                </a:extLst>
+              </a:tr>
+            </a:tbl>
+          </a:graphicData>
+        </a:graphic>
+      </p:graphicFrame>
+      <p:sp>
+        <p:nvSpPr>
+          <p:cNvPr id="6" name="Rectangle 1"/>
+          <p:cNvSpPr>
+            <a:spLocks noChangeArrowheads="1"/>
+          </p:cNvSpPr>
+          <p:nvPr/>
+        </p:nvSpPr>
+        <p:spPr bwMode="auto">
+          <a:xfrm>
+            <a:off x="7680960" y="2704387"/>
+            <a:ext cx="4187953" cy="1723549"/>
+          </a:xfrm>
+          <a:prstGeom prst="rect">
+            <a:avLst/>
+          </a:prstGeom>
+          <a:solidFill>
+            <a:srgbClr val="FFFFFF"/>
+          </a:solidFill>
+          <a:ln w="19050">
+            <a:solidFill>
+              <a:schemeClr val="tx1"/>
+            </a:solidFill>
+            <a:miter lim="800000"/>
+            <a:headEnd/>
+            <a:tailEnd/>
+          </a:ln>
+          <a:effectLst/>
+          <a:extLst>
+            <a:ext uri="{AF507438-7753-43E0-B8FC-AC1667EBCBE1}">
+              <a14:hiddenEffects xmlns:a14="http://schemas.microsoft.com/office/drawing/2010/main">
+                <a:effectLst>
+                  <a:outerShdw dist="35921" dir="2700000" algn="ctr" rotWithShape="0">
+                    <a:schemeClr val="bg2"/>
+                  </a:outerShdw>
+                </a:effectLst>
+              </a14:hiddenEffects>
+            </a:ext>
+          </a:extLst>
+        </p:spPr>
+        <p:txBody>
+          <a:bodyPr vert="horz" wrap="square" lIns="0" tIns="0" rIns="0" bIns="0" numCol="1" anchor="ctr" anchorCtr="0" compatLnSpc="1">
+            <a:prstTxWarp prst="textNoShape">
+              <a:avLst/>
+            </a:prstTxWarp>
+            <a:spAutoFit/>
+          </a:bodyPr>
+          <a:lstStyle/>
+          <a:p>
+            <a:pPr marL="0" marR="0" lvl="0" indent="0" algn="l" defTabSz="914400" rtl="0" eaLnBrk="0" fontAlgn="base" latinLnBrk="0" hangingPunct="0">
+              <a:lnSpc>
+                <a:spcPct val="100000"/>
+              </a:lnSpc>
+              <a:spcBef>
+                <a:spcPct val="0"/>
+              </a:spcBef>
+              <a:spcAft>
+                <a:spcPct val="0"/>
+              </a:spcAft>
+              <a:buClrTx/>
+              <a:buSzTx/>
+              <a:buFontTx/>
+              <a:buNone/>
+              <a:tabLst/>
+            </a:pPr>
+            <a:r>
+              <a:rPr lang="en-US" altLang="en-US" sz="1400" dirty="0">
+                <a:solidFill>
+                  <a:srgbClr val="000000"/>
+                </a:solidFill>
+                <a:latin typeface="Courier New" panose="02070309020205020404" pitchFamily="49" charset="0"/>
+              </a:rPr>
+              <a:t> Number </a:t>
+            </a:r>
+            <a:r>
+              <a:rPr kumimoji="0" lang="en-US" altLang="en-US" sz="1400" b="0" i="0" u="none" strike="noStrike" cap="none" normalizeH="0" baseline="0" dirty="0">
+                <a:ln>
+                  <a:noFill/>
+                </a:ln>
+                <a:solidFill>
+                  <a:srgbClr val="000000"/>
+                </a:solidFill>
+                <a:effectLst/>
+                <a:latin typeface="Courier New" panose="02070309020205020404" pitchFamily="49" charset="0"/>
+              </a:rPr>
+              <a:t>of </a:t>
+            </a:r>
+          </a:p>
+          <a:p>
+            <a:pPr lvl="0" defTabSz="914400" eaLnBrk="0" fontAlgn="base" hangingPunct="0">
+              <a:spcBef>
+                <a:spcPct val="0"/>
+              </a:spcBef>
+              <a:spcAft>
+                <a:spcPct val="0"/>
+              </a:spcAft>
+            </a:pPr>
+            <a:r>
+              <a:rPr kumimoji="0" lang="en-US" altLang="en-US" sz="1400" b="0" i="0" u="none" strike="noStrike" cap="none" normalizeH="0" baseline="0" dirty="0">
+                <a:ln>
+                  <a:noFill/>
+                </a:ln>
+                <a:solidFill>
+                  <a:srgbClr val="000000"/>
+                </a:solidFill>
+                <a:effectLst/>
+                <a:latin typeface="Courier New" panose="02070309020205020404" pitchFamily="49" charset="0"/>
+              </a:rPr>
+              <a:t> Sub-</a:t>
+            </a:r>
+            <a:r>
+              <a:rPr lang="en-US" altLang="en-US" sz="1400" dirty="0">
+                <a:solidFill>
+                  <a:srgbClr val="000000"/>
+                </a:solidFill>
+                <a:latin typeface="Courier New" panose="02070309020205020404" pitchFamily="49" charset="0"/>
+              </a:rPr>
+              <a:t>Images     </a:t>
+            </a:r>
+            <a:r>
+              <a:rPr kumimoji="0" lang="en-US" altLang="en-US" sz="1400" b="0" i="0" u="none" strike="noStrike" cap="none" normalizeH="0" baseline="0" dirty="0">
+                <a:ln>
+                  <a:noFill/>
+                </a:ln>
+                <a:solidFill>
+                  <a:srgbClr val="000000"/>
+                </a:solidFill>
+                <a:effectLst/>
+                <a:latin typeface="Courier New" panose="02070309020205020404" pitchFamily="49" charset="0"/>
+              </a:rPr>
+              <a:t>Cancer?	Image Size</a:t>
+            </a:r>
+          </a:p>
+          <a:p>
+            <a:pPr marL="0" marR="0" lvl="0" indent="0" algn="l" defTabSz="914400" rtl="0" eaLnBrk="0" fontAlgn="base" latinLnBrk="0" hangingPunct="0">
+              <a:lnSpc>
+                <a:spcPct val="100000"/>
+              </a:lnSpc>
+              <a:spcBef>
+                <a:spcPct val="0"/>
+              </a:spcBef>
+              <a:spcAft>
+                <a:spcPct val="0"/>
+              </a:spcAft>
+              <a:buClrTx/>
+              <a:buSzTx/>
+              <a:buFontTx/>
+              <a:buNone/>
+              <a:tabLst/>
+            </a:pPr>
+            <a:r>
+              <a:rPr kumimoji="0" lang="en-US" altLang="en-US" sz="1400" b="0" i="0" u="none" strike="noStrike" cap="none" normalizeH="0" baseline="0" dirty="0">
+                <a:ln>
+                  <a:noFill/>
+                </a:ln>
+                <a:solidFill>
+                  <a:srgbClr val="000000"/>
+                </a:solidFill>
+                <a:effectLst/>
+                <a:latin typeface="Courier New" panose="02070309020205020404" pitchFamily="49" charset="0"/>
+              </a:rPr>
+              <a:t> =====================================</a:t>
+            </a:r>
+          </a:p>
+          <a:p>
+            <a:pPr marL="0" marR="0" lvl="0" indent="0" algn="l" defTabSz="914400" rtl="0" eaLnBrk="0" fontAlgn="base" latinLnBrk="0" hangingPunct="0">
+              <a:lnSpc>
+                <a:spcPct val="100000"/>
+              </a:lnSpc>
+              <a:spcBef>
+                <a:spcPct val="0"/>
+              </a:spcBef>
+              <a:spcAft>
+                <a:spcPct val="0"/>
+              </a:spcAft>
+              <a:buClrTx/>
+              <a:buSzTx/>
+              <a:buFontTx/>
+              <a:buNone/>
+              <a:tabLst/>
+            </a:pPr>
+            <a:r>
+              <a:rPr kumimoji="0" lang="en-US" altLang="en-US" sz="1400" b="0" i="0" u="none" strike="noStrike" cap="none" normalizeH="0" baseline="0" dirty="0">
+                <a:ln>
+                  <a:noFill/>
+                </a:ln>
+                <a:solidFill>
+                  <a:srgbClr val="000000"/>
+                </a:solidFill>
+                <a:effectLst/>
+                <a:latin typeface="Courier New" panose="02070309020205020404" pitchFamily="49" charset="0"/>
+              </a:rPr>
+              <a:t> 134 		0 	(512, 512)</a:t>
+            </a:r>
+          </a:p>
+          <a:p>
+            <a:pPr marL="0" marR="0" lvl="0" indent="0" algn="l" defTabSz="914400" rtl="0" eaLnBrk="0" fontAlgn="base" latinLnBrk="0" hangingPunct="0">
+              <a:lnSpc>
+                <a:spcPct val="100000"/>
+              </a:lnSpc>
+              <a:spcBef>
+                <a:spcPct val="0"/>
+              </a:spcBef>
+              <a:spcAft>
+                <a:spcPct val="0"/>
+              </a:spcAft>
+              <a:buClrTx/>
+              <a:buSzTx/>
+              <a:buFontTx/>
+              <a:buNone/>
+              <a:tabLst/>
+            </a:pPr>
+            <a:r>
+              <a:rPr kumimoji="0" lang="en-US" altLang="en-US" sz="1400" b="0" i="0" u="none" strike="noStrike" cap="none" normalizeH="0" baseline="0" dirty="0">
+                <a:ln>
+                  <a:noFill/>
+                </a:ln>
+                <a:solidFill>
+                  <a:srgbClr val="000000"/>
+                </a:solidFill>
+                <a:effectLst/>
+                <a:latin typeface="Courier New" panose="02070309020205020404" pitchFamily="49" charset="0"/>
+              </a:rPr>
+              <a:t> 128 		0 	(512, 512) </a:t>
+            </a:r>
+          </a:p>
+          <a:p>
+            <a:pPr marL="0" marR="0" lvl="0" indent="0" algn="l" defTabSz="914400" rtl="0" eaLnBrk="0" fontAlgn="base" latinLnBrk="0" hangingPunct="0">
+              <a:lnSpc>
+                <a:spcPct val="100000"/>
+              </a:lnSpc>
+              <a:spcBef>
+                <a:spcPct val="0"/>
+              </a:spcBef>
+              <a:spcAft>
+                <a:spcPct val="0"/>
+              </a:spcAft>
+              <a:buClrTx/>
+              <a:buSzTx/>
+              <a:buFontTx/>
+              <a:buNone/>
+              <a:tabLst/>
+            </a:pPr>
+            <a:r>
+              <a:rPr kumimoji="0" lang="en-US" altLang="en-US" sz="1400" b="0" i="0" u="none" strike="noStrike" cap="none" normalizeH="0" baseline="0" dirty="0">
+                <a:ln>
+                  <a:noFill/>
+                </a:ln>
+                <a:solidFill>
+                  <a:srgbClr val="000000"/>
+                </a:solidFill>
+                <a:effectLst/>
+                <a:latin typeface="Courier New" panose="02070309020205020404" pitchFamily="49" charset="0"/>
+              </a:rPr>
+              <a:t> 133 		0 	(512, 512) </a:t>
+            </a:r>
+          </a:p>
+          <a:p>
+            <a:pPr marL="0" marR="0" lvl="0" indent="0" algn="l" defTabSz="914400" rtl="0" eaLnBrk="0" fontAlgn="base" latinLnBrk="0" hangingPunct="0">
+              <a:lnSpc>
+                <a:spcPct val="100000"/>
+              </a:lnSpc>
+              <a:spcBef>
+                <a:spcPct val="0"/>
+              </a:spcBef>
+              <a:spcAft>
+                <a:spcPct val="0"/>
+              </a:spcAft>
+              <a:buClrTx/>
+              <a:buSzTx/>
+              <a:buFontTx/>
+              <a:buNone/>
+              <a:tabLst/>
+            </a:pPr>
+            <a:r>
+              <a:rPr kumimoji="0" lang="en-US" altLang="en-US" sz="1400" b="0" i="0" u="none" strike="noStrike" cap="none" normalizeH="0" baseline="0" dirty="0">
+                <a:ln>
+                  <a:noFill/>
+                </a:ln>
+                <a:solidFill>
+                  <a:srgbClr val="000000"/>
+                </a:solidFill>
+                <a:effectLst/>
+                <a:latin typeface="Courier New" panose="02070309020205020404" pitchFamily="49" charset="0"/>
+              </a:rPr>
+              <a:t> 110 		0 	(512, 512) </a:t>
+            </a:r>
+          </a:p>
+          <a:p>
+            <a:pPr marL="0" marR="0" lvl="0" indent="0" algn="l" defTabSz="914400" rtl="0" eaLnBrk="0" fontAlgn="base" latinLnBrk="0" hangingPunct="0">
+              <a:lnSpc>
+                <a:spcPct val="100000"/>
+              </a:lnSpc>
+              <a:spcBef>
+                <a:spcPct val="0"/>
+              </a:spcBef>
+              <a:spcAft>
+                <a:spcPct val="0"/>
+              </a:spcAft>
+              <a:buClrTx/>
+              <a:buSzTx/>
+              <a:buFontTx/>
+              <a:buNone/>
+              <a:tabLst/>
+            </a:pPr>
+            <a:r>
+              <a:rPr kumimoji="0" lang="en-US" altLang="en-US" sz="1400" b="0" i="0" u="none" strike="noStrike" cap="none" normalizeH="0" baseline="0" dirty="0">
+                <a:ln>
+                  <a:noFill/>
+                </a:ln>
+                <a:solidFill>
+                  <a:srgbClr val="000000"/>
+                </a:solidFill>
+                <a:effectLst/>
+                <a:latin typeface="Courier New" panose="02070309020205020404" pitchFamily="49" charset="0"/>
+              </a:rPr>
+              <a:t> 203 		1 	(512, 512)</a:t>
+            </a:r>
+            <a:r>
+              <a:rPr kumimoji="0" lang="en-US" altLang="en-US" sz="1400" b="0" i="0" u="none" strike="noStrike" cap="none" normalizeH="0" baseline="0" dirty="0">
+                <a:ln>
+                  <a:noFill/>
+                </a:ln>
+                <a:solidFill>
+                  <a:schemeClr val="tx1"/>
+                </a:solidFill>
+                <a:effectLst/>
+              </a:rPr>
+              <a:t> </a:t>
+            </a:r>
+            <a:endParaRPr kumimoji="0" lang="en-US" altLang="en-US" sz="1400" b="0" i="0" u="none" strike="noStrike" cap="none" normalizeH="0" baseline="0" dirty="0">
+              <a:ln>
+                <a:noFill/>
+              </a:ln>
+              <a:solidFill>
+                <a:schemeClr val="tx1"/>
+              </a:solidFill>
+              <a:effectLst/>
+              <a:latin typeface="Arial" panose="020B0604020202020204" pitchFamily="34" charset="0"/>
+            </a:endParaRPr>
           </a:p>
         </p:txBody>
       </p:sp>
@@ -13470,6 +14476,1023 @@
     <p:extLst>
       <p:ext uri="{BB962C8B-B14F-4D97-AF65-F5344CB8AC3E}">
         <p14:creationId xmlns:p14="http://schemas.microsoft.com/office/powerpoint/2010/main" val="3801042527"/>
+      </p:ext>
+    </p:extLst>
+  </p:cSld>
+  <p:clrMapOvr>
+    <a:masterClrMapping/>
+  </p:clrMapOvr>
+</p:sld>
+</file>
+
+<file path=ppt/slides/slide3.xml><?xml version="1.0" encoding="utf-8"?>
+<p:sld xmlns:a="http://schemas.openxmlformats.org/drawingml/2006/main" xmlns:r="http://schemas.openxmlformats.org/officeDocument/2006/relationships" xmlns:p="http://schemas.openxmlformats.org/presentationml/2006/main">
+  <p:cSld>
+    <p:spTree>
+      <p:nvGrpSpPr>
+        <p:cNvPr id="1" name=""/>
+        <p:cNvGrpSpPr/>
+        <p:nvPr/>
+      </p:nvGrpSpPr>
+      <p:grpSpPr>
+        <a:xfrm>
+          <a:off x="0" y="0"/>
+          <a:ext cx="0" cy="0"/>
+          <a:chOff x="0" y="0"/>
+          <a:chExt cx="0" cy="0"/>
+        </a:xfrm>
+      </p:grpSpPr>
+      <p:sp>
+        <p:nvSpPr>
+          <p:cNvPr id="2" name="Title 1"/>
+          <p:cNvSpPr>
+            <a:spLocks noGrp="1"/>
+          </p:cNvSpPr>
+          <p:nvPr>
+            <p:ph type="title"/>
+          </p:nvPr>
+        </p:nvSpPr>
+        <p:spPr/>
+        <p:txBody>
+          <a:bodyPr/>
+          <a:lstStyle/>
+          <a:p>
+            <a:r>
+              <a:rPr lang="en-US" dirty="0"/>
+              <a:t>Visualizing and Conditioning the Data</a:t>
+            </a:r>
+          </a:p>
+        </p:txBody>
+      </p:sp>
+      <p:sp>
+        <p:nvSpPr>
+          <p:cNvPr id="3" name="Content Placeholder 2"/>
+          <p:cNvSpPr>
+            <a:spLocks noGrp="1"/>
+          </p:cNvSpPr>
+          <p:nvPr>
+            <p:ph idx="1"/>
+          </p:nvPr>
+        </p:nvSpPr>
+        <p:spPr>
+          <a:xfrm>
+            <a:off x="624602" y="3980056"/>
+            <a:ext cx="2070782" cy="268540"/>
+          </a:xfrm>
+        </p:spPr>
+        <p:txBody>
+          <a:bodyPr>
+            <a:normAutofit fontScale="77500" lnSpcReduction="20000"/>
+          </a:bodyPr>
+          <a:lstStyle/>
+          <a:p>
+            <a:r>
+              <a:rPr lang="en-US" dirty="0"/>
+              <a:t>Original 2D Slices</a:t>
+            </a:r>
+          </a:p>
+        </p:txBody>
+      </p:sp>
+      <p:pic>
+        <p:nvPicPr>
+          <p:cNvPr id="5" name="Picture 4"/>
+          <p:cNvPicPr>
+            <a:picLocks noChangeAspect="1"/>
+          </p:cNvPicPr>
+          <p:nvPr/>
+        </p:nvPicPr>
+        <p:blipFill>
+          <a:blip r:embed="rId2"/>
+          <a:stretch>
+            <a:fillRect/>
+          </a:stretch>
+        </p:blipFill>
+        <p:spPr>
+          <a:xfrm>
+            <a:off x="242887" y="4248596"/>
+            <a:ext cx="2562225" cy="2476500"/>
+          </a:xfrm>
+          <a:prstGeom prst="rect">
+            <a:avLst/>
+          </a:prstGeom>
+        </p:spPr>
+      </p:pic>
+      <p:sp>
+        <p:nvSpPr>
+          <p:cNvPr id="7" name="Content Placeholder 2"/>
+          <p:cNvSpPr txBox="1">
+            <a:spLocks/>
+          </p:cNvSpPr>
+          <p:nvPr/>
+        </p:nvSpPr>
+        <p:spPr>
+          <a:xfrm>
+            <a:off x="511826" y="2523162"/>
+            <a:ext cx="11210781" cy="1344750"/>
+          </a:xfrm>
+          <a:prstGeom prst="rect">
+            <a:avLst/>
+          </a:prstGeom>
+        </p:spPr>
+        <p:txBody>
+          <a:bodyPr vert="horz" lIns="91440" tIns="45720" rIns="91440" bIns="45720" rtlCol="0">
+            <a:normAutofit fontScale="92500" lnSpcReduction="10000"/>
+          </a:bodyPr>
+          <a:lstStyle>
+            <a:lvl1pPr marL="342900" indent="-342900" algn="l" defTabSz="457200" rtl="0" eaLnBrk="1" latinLnBrk="0" hangingPunct="1">
+              <a:spcBef>
+                <a:spcPts val="1000"/>
+              </a:spcBef>
+              <a:spcAft>
+                <a:spcPts val="0"/>
+              </a:spcAft>
+              <a:buClr>
+                <a:schemeClr val="accent1"/>
+              </a:buClr>
+              <a:buSzPct val="80000"/>
+              <a:buFont typeface="Wingdings 3" charset="2"/>
+              <a:buChar char=""/>
+              <a:defRPr sz="1800" b="0" i="0" kern="1200">
+                <a:solidFill>
+                  <a:schemeClr val="tx1">
+                    <a:lumMod val="75000"/>
+                    <a:lumOff val="25000"/>
+                  </a:schemeClr>
+                </a:solidFill>
+                <a:latin typeface="+mn-lt"/>
+                <a:ea typeface="+mn-ea"/>
+                <a:cs typeface="+mn-cs"/>
+              </a:defRPr>
+            </a:lvl1pPr>
+            <a:lvl2pPr marL="742950" indent="-285750" algn="l" defTabSz="457200" rtl="0" eaLnBrk="1" latinLnBrk="0" hangingPunct="1">
+              <a:spcBef>
+                <a:spcPts val="1000"/>
+              </a:spcBef>
+              <a:spcAft>
+                <a:spcPts val="0"/>
+              </a:spcAft>
+              <a:buClr>
+                <a:schemeClr val="accent1"/>
+              </a:buClr>
+              <a:buSzPct val="80000"/>
+              <a:buFont typeface="Wingdings 3" charset="2"/>
+              <a:buChar char=""/>
+              <a:defRPr sz="1600" b="0" i="0" kern="1200">
+                <a:solidFill>
+                  <a:schemeClr val="tx1">
+                    <a:lumMod val="75000"/>
+                    <a:lumOff val="25000"/>
+                  </a:schemeClr>
+                </a:solidFill>
+                <a:latin typeface="+mn-lt"/>
+                <a:ea typeface="+mn-ea"/>
+                <a:cs typeface="+mn-cs"/>
+              </a:defRPr>
+            </a:lvl2pPr>
+            <a:lvl3pPr marL="1143000" indent="-228600" algn="l" defTabSz="457200" rtl="0" eaLnBrk="1" latinLnBrk="0" hangingPunct="1">
+              <a:spcBef>
+                <a:spcPts val="1000"/>
+              </a:spcBef>
+              <a:spcAft>
+                <a:spcPts val="0"/>
+              </a:spcAft>
+              <a:buClr>
+                <a:schemeClr val="accent1"/>
+              </a:buClr>
+              <a:buSzPct val="80000"/>
+              <a:buFont typeface="Wingdings 3" charset="2"/>
+              <a:buChar char=""/>
+              <a:defRPr sz="1400" b="0" i="0" kern="1200">
+                <a:solidFill>
+                  <a:schemeClr val="tx1">
+                    <a:lumMod val="75000"/>
+                    <a:lumOff val="25000"/>
+                  </a:schemeClr>
+                </a:solidFill>
+                <a:latin typeface="+mn-lt"/>
+                <a:ea typeface="+mn-ea"/>
+                <a:cs typeface="+mn-cs"/>
+              </a:defRPr>
+            </a:lvl3pPr>
+            <a:lvl4pPr marL="1600200" indent="-228600" algn="l" defTabSz="457200" rtl="0" eaLnBrk="1" latinLnBrk="0" hangingPunct="1">
+              <a:spcBef>
+                <a:spcPts val="1000"/>
+              </a:spcBef>
+              <a:spcAft>
+                <a:spcPts val="0"/>
+              </a:spcAft>
+              <a:buClr>
+                <a:schemeClr val="accent1"/>
+              </a:buClr>
+              <a:buSzPct val="80000"/>
+              <a:buFont typeface="Wingdings 3" charset="2"/>
+              <a:buChar char=""/>
+              <a:defRPr sz="1200" b="0" i="0" kern="1200">
+                <a:solidFill>
+                  <a:schemeClr val="tx1">
+                    <a:lumMod val="75000"/>
+                    <a:lumOff val="25000"/>
+                  </a:schemeClr>
+                </a:solidFill>
+                <a:latin typeface="+mn-lt"/>
+                <a:ea typeface="+mn-ea"/>
+                <a:cs typeface="+mn-cs"/>
+              </a:defRPr>
+            </a:lvl4pPr>
+            <a:lvl5pPr marL="2057400" indent="-228600" algn="l" defTabSz="457200" rtl="0" eaLnBrk="1" latinLnBrk="0" hangingPunct="1">
+              <a:spcBef>
+                <a:spcPts val="1000"/>
+              </a:spcBef>
+              <a:spcAft>
+                <a:spcPts val="0"/>
+              </a:spcAft>
+              <a:buClr>
+                <a:schemeClr val="accent1"/>
+              </a:buClr>
+              <a:buSzPct val="80000"/>
+              <a:buFont typeface="Wingdings 3" charset="2"/>
+              <a:buChar char=""/>
+              <a:defRPr sz="1200" b="0" i="0" kern="1200">
+                <a:solidFill>
+                  <a:schemeClr val="tx1">
+                    <a:lumMod val="75000"/>
+                    <a:lumOff val="25000"/>
+                  </a:schemeClr>
+                </a:solidFill>
+                <a:latin typeface="+mn-lt"/>
+                <a:ea typeface="+mn-ea"/>
+                <a:cs typeface="+mn-cs"/>
+              </a:defRPr>
+            </a:lvl5pPr>
+            <a:lvl6pPr marL="2514600" indent="-228600" algn="l" defTabSz="457200" rtl="0" eaLnBrk="1" latinLnBrk="0" hangingPunct="1">
+              <a:spcBef>
+                <a:spcPts val="1000"/>
+              </a:spcBef>
+              <a:spcAft>
+                <a:spcPts val="0"/>
+              </a:spcAft>
+              <a:buClr>
+                <a:schemeClr val="accent1"/>
+              </a:buClr>
+              <a:buSzPct val="80000"/>
+              <a:buFont typeface="Wingdings 3" charset="2"/>
+              <a:buChar char=""/>
+              <a:defRPr sz="1200" b="0" i="0" kern="1200">
+                <a:solidFill>
+                  <a:schemeClr val="tx1">
+                    <a:lumMod val="75000"/>
+                    <a:lumOff val="25000"/>
+                  </a:schemeClr>
+                </a:solidFill>
+                <a:latin typeface="+mn-lt"/>
+                <a:ea typeface="+mn-ea"/>
+                <a:cs typeface="+mn-cs"/>
+              </a:defRPr>
+            </a:lvl6pPr>
+            <a:lvl7pPr marL="2971800" indent="-228600" algn="l" defTabSz="457200" rtl="0" eaLnBrk="1" latinLnBrk="0" hangingPunct="1">
+              <a:spcBef>
+                <a:spcPts val="1000"/>
+              </a:spcBef>
+              <a:spcAft>
+                <a:spcPts val="0"/>
+              </a:spcAft>
+              <a:buClr>
+                <a:schemeClr val="accent1"/>
+              </a:buClr>
+              <a:buSzPct val="80000"/>
+              <a:buFont typeface="Wingdings 3" charset="2"/>
+              <a:buChar char=""/>
+              <a:defRPr sz="1200" b="0" i="0" kern="1200">
+                <a:solidFill>
+                  <a:schemeClr val="tx1">
+                    <a:lumMod val="75000"/>
+                    <a:lumOff val="25000"/>
+                  </a:schemeClr>
+                </a:solidFill>
+                <a:latin typeface="+mn-lt"/>
+                <a:ea typeface="+mn-ea"/>
+                <a:cs typeface="+mn-cs"/>
+              </a:defRPr>
+            </a:lvl7pPr>
+            <a:lvl8pPr marL="3429000" indent="-228600" algn="l" defTabSz="457200" rtl="0" eaLnBrk="1" latinLnBrk="0" hangingPunct="1">
+              <a:spcBef>
+                <a:spcPts val="1000"/>
+              </a:spcBef>
+              <a:spcAft>
+                <a:spcPts val="0"/>
+              </a:spcAft>
+              <a:buClr>
+                <a:schemeClr val="accent1"/>
+              </a:buClr>
+              <a:buSzPct val="80000"/>
+              <a:buFont typeface="Wingdings 3" charset="2"/>
+              <a:buChar char=""/>
+              <a:defRPr sz="1200" b="0" i="0" kern="1200">
+                <a:solidFill>
+                  <a:schemeClr val="tx1">
+                    <a:lumMod val="75000"/>
+                    <a:lumOff val="25000"/>
+                  </a:schemeClr>
+                </a:solidFill>
+                <a:latin typeface="+mn-lt"/>
+                <a:ea typeface="+mn-ea"/>
+                <a:cs typeface="+mn-cs"/>
+              </a:defRPr>
+            </a:lvl8pPr>
+            <a:lvl9pPr marL="3886200" indent="-228600" algn="l" defTabSz="457200" rtl="0" eaLnBrk="1" latinLnBrk="0" hangingPunct="1">
+              <a:spcBef>
+                <a:spcPts val="1000"/>
+              </a:spcBef>
+              <a:spcAft>
+                <a:spcPts val="0"/>
+              </a:spcAft>
+              <a:buClr>
+                <a:schemeClr val="accent1"/>
+              </a:buClr>
+              <a:buSzPct val="80000"/>
+              <a:buFont typeface="Wingdings 3" charset="2"/>
+              <a:buChar char=""/>
+              <a:defRPr sz="1200" b="0" i="0" kern="1200">
+                <a:solidFill>
+                  <a:schemeClr val="tx1">
+                    <a:lumMod val="75000"/>
+                    <a:lumOff val="25000"/>
+                  </a:schemeClr>
+                </a:solidFill>
+                <a:latin typeface="+mn-lt"/>
+                <a:ea typeface="+mn-ea"/>
+                <a:cs typeface="+mn-cs"/>
+              </a:defRPr>
+            </a:lvl9pPr>
+          </a:lstStyle>
+          <a:p>
+            <a:r>
+              <a:rPr lang="en-US" dirty="0"/>
+              <a:t>Convolutional Neural Nets (CNN) use small image sizes typically 64x64 or smaller and the same number of inputs</a:t>
+            </a:r>
+          </a:p>
+          <a:p>
+            <a:r>
+              <a:rPr lang="en-US" dirty="0"/>
+              <a:t>This presents a conditioning problem in how to get [512,512] x ~200 layers into that format!!!</a:t>
+            </a:r>
+          </a:p>
+          <a:p>
+            <a:r>
+              <a:rPr lang="en-US" dirty="0"/>
+              <a:t>Techniques – Resize, Chunk Layers together to same number per </a:t>
+            </a:r>
+            <a:r>
+              <a:rPr lang="en-US" dirty="0" err="1"/>
+              <a:t>Dicom</a:t>
+            </a:r>
+            <a:r>
+              <a:rPr lang="en-US" dirty="0"/>
+              <a:t> using an averaging function</a:t>
+            </a:r>
+          </a:p>
+        </p:txBody>
+      </p:sp>
+      <p:pic>
+        <p:nvPicPr>
+          <p:cNvPr id="10" name="Picture 9"/>
+          <p:cNvPicPr>
+            <a:picLocks noChangeAspect="1"/>
+          </p:cNvPicPr>
+          <p:nvPr/>
+        </p:nvPicPr>
+        <p:blipFill>
+          <a:blip r:embed="rId3"/>
+          <a:stretch>
+            <a:fillRect/>
+          </a:stretch>
+        </p:blipFill>
+        <p:spPr>
+          <a:xfrm>
+            <a:off x="3570829" y="4248596"/>
+            <a:ext cx="3533775" cy="2419350"/>
+          </a:xfrm>
+          <a:prstGeom prst="rect">
+            <a:avLst/>
+          </a:prstGeom>
+        </p:spPr>
+      </p:pic>
+      <p:sp>
+        <p:nvSpPr>
+          <p:cNvPr id="11" name="Content Placeholder 2"/>
+          <p:cNvSpPr txBox="1">
+            <a:spLocks/>
+          </p:cNvSpPr>
+          <p:nvPr/>
+        </p:nvSpPr>
+        <p:spPr>
+          <a:xfrm>
+            <a:off x="4302325" y="3979582"/>
+            <a:ext cx="2070782" cy="268540"/>
+          </a:xfrm>
+          <a:prstGeom prst="rect">
+            <a:avLst/>
+          </a:prstGeom>
+        </p:spPr>
+        <p:txBody>
+          <a:bodyPr vert="horz" lIns="91440" tIns="45720" rIns="91440" bIns="45720" rtlCol="0">
+            <a:normAutofit fontScale="77500" lnSpcReduction="20000"/>
+          </a:bodyPr>
+          <a:lstStyle>
+            <a:lvl1pPr marL="342900" indent="-342900" algn="l" defTabSz="457200" rtl="0" eaLnBrk="1" latinLnBrk="0" hangingPunct="1">
+              <a:spcBef>
+                <a:spcPts val="1000"/>
+              </a:spcBef>
+              <a:spcAft>
+                <a:spcPts val="0"/>
+              </a:spcAft>
+              <a:buClr>
+                <a:schemeClr val="accent1"/>
+              </a:buClr>
+              <a:buSzPct val="80000"/>
+              <a:buFont typeface="Wingdings 3" charset="2"/>
+              <a:buChar char=""/>
+              <a:defRPr sz="1800" b="0" i="0" kern="1200">
+                <a:solidFill>
+                  <a:schemeClr val="tx1">
+                    <a:lumMod val="75000"/>
+                    <a:lumOff val="25000"/>
+                  </a:schemeClr>
+                </a:solidFill>
+                <a:latin typeface="+mn-lt"/>
+                <a:ea typeface="+mn-ea"/>
+                <a:cs typeface="+mn-cs"/>
+              </a:defRPr>
+            </a:lvl1pPr>
+            <a:lvl2pPr marL="742950" indent="-285750" algn="l" defTabSz="457200" rtl="0" eaLnBrk="1" latinLnBrk="0" hangingPunct="1">
+              <a:spcBef>
+                <a:spcPts val="1000"/>
+              </a:spcBef>
+              <a:spcAft>
+                <a:spcPts val="0"/>
+              </a:spcAft>
+              <a:buClr>
+                <a:schemeClr val="accent1"/>
+              </a:buClr>
+              <a:buSzPct val="80000"/>
+              <a:buFont typeface="Wingdings 3" charset="2"/>
+              <a:buChar char=""/>
+              <a:defRPr sz="1600" b="0" i="0" kern="1200">
+                <a:solidFill>
+                  <a:schemeClr val="tx1">
+                    <a:lumMod val="75000"/>
+                    <a:lumOff val="25000"/>
+                  </a:schemeClr>
+                </a:solidFill>
+                <a:latin typeface="+mn-lt"/>
+                <a:ea typeface="+mn-ea"/>
+                <a:cs typeface="+mn-cs"/>
+              </a:defRPr>
+            </a:lvl2pPr>
+            <a:lvl3pPr marL="1143000" indent="-228600" algn="l" defTabSz="457200" rtl="0" eaLnBrk="1" latinLnBrk="0" hangingPunct="1">
+              <a:spcBef>
+                <a:spcPts val="1000"/>
+              </a:spcBef>
+              <a:spcAft>
+                <a:spcPts val="0"/>
+              </a:spcAft>
+              <a:buClr>
+                <a:schemeClr val="accent1"/>
+              </a:buClr>
+              <a:buSzPct val="80000"/>
+              <a:buFont typeface="Wingdings 3" charset="2"/>
+              <a:buChar char=""/>
+              <a:defRPr sz="1400" b="0" i="0" kern="1200">
+                <a:solidFill>
+                  <a:schemeClr val="tx1">
+                    <a:lumMod val="75000"/>
+                    <a:lumOff val="25000"/>
+                  </a:schemeClr>
+                </a:solidFill>
+                <a:latin typeface="+mn-lt"/>
+                <a:ea typeface="+mn-ea"/>
+                <a:cs typeface="+mn-cs"/>
+              </a:defRPr>
+            </a:lvl3pPr>
+            <a:lvl4pPr marL="1600200" indent="-228600" algn="l" defTabSz="457200" rtl="0" eaLnBrk="1" latinLnBrk="0" hangingPunct="1">
+              <a:spcBef>
+                <a:spcPts val="1000"/>
+              </a:spcBef>
+              <a:spcAft>
+                <a:spcPts val="0"/>
+              </a:spcAft>
+              <a:buClr>
+                <a:schemeClr val="accent1"/>
+              </a:buClr>
+              <a:buSzPct val="80000"/>
+              <a:buFont typeface="Wingdings 3" charset="2"/>
+              <a:buChar char=""/>
+              <a:defRPr sz="1200" b="0" i="0" kern="1200">
+                <a:solidFill>
+                  <a:schemeClr val="tx1">
+                    <a:lumMod val="75000"/>
+                    <a:lumOff val="25000"/>
+                  </a:schemeClr>
+                </a:solidFill>
+                <a:latin typeface="+mn-lt"/>
+                <a:ea typeface="+mn-ea"/>
+                <a:cs typeface="+mn-cs"/>
+              </a:defRPr>
+            </a:lvl4pPr>
+            <a:lvl5pPr marL="2057400" indent="-228600" algn="l" defTabSz="457200" rtl="0" eaLnBrk="1" latinLnBrk="0" hangingPunct="1">
+              <a:spcBef>
+                <a:spcPts val="1000"/>
+              </a:spcBef>
+              <a:spcAft>
+                <a:spcPts val="0"/>
+              </a:spcAft>
+              <a:buClr>
+                <a:schemeClr val="accent1"/>
+              </a:buClr>
+              <a:buSzPct val="80000"/>
+              <a:buFont typeface="Wingdings 3" charset="2"/>
+              <a:buChar char=""/>
+              <a:defRPr sz="1200" b="0" i="0" kern="1200">
+                <a:solidFill>
+                  <a:schemeClr val="tx1">
+                    <a:lumMod val="75000"/>
+                    <a:lumOff val="25000"/>
+                  </a:schemeClr>
+                </a:solidFill>
+                <a:latin typeface="+mn-lt"/>
+                <a:ea typeface="+mn-ea"/>
+                <a:cs typeface="+mn-cs"/>
+              </a:defRPr>
+            </a:lvl5pPr>
+            <a:lvl6pPr marL="2514600" indent="-228600" algn="l" defTabSz="457200" rtl="0" eaLnBrk="1" latinLnBrk="0" hangingPunct="1">
+              <a:spcBef>
+                <a:spcPts val="1000"/>
+              </a:spcBef>
+              <a:spcAft>
+                <a:spcPts val="0"/>
+              </a:spcAft>
+              <a:buClr>
+                <a:schemeClr val="accent1"/>
+              </a:buClr>
+              <a:buSzPct val="80000"/>
+              <a:buFont typeface="Wingdings 3" charset="2"/>
+              <a:buChar char=""/>
+              <a:defRPr sz="1200" b="0" i="0" kern="1200">
+                <a:solidFill>
+                  <a:schemeClr val="tx1">
+                    <a:lumMod val="75000"/>
+                    <a:lumOff val="25000"/>
+                  </a:schemeClr>
+                </a:solidFill>
+                <a:latin typeface="+mn-lt"/>
+                <a:ea typeface="+mn-ea"/>
+                <a:cs typeface="+mn-cs"/>
+              </a:defRPr>
+            </a:lvl6pPr>
+            <a:lvl7pPr marL="2971800" indent="-228600" algn="l" defTabSz="457200" rtl="0" eaLnBrk="1" latinLnBrk="0" hangingPunct="1">
+              <a:spcBef>
+                <a:spcPts val="1000"/>
+              </a:spcBef>
+              <a:spcAft>
+                <a:spcPts val="0"/>
+              </a:spcAft>
+              <a:buClr>
+                <a:schemeClr val="accent1"/>
+              </a:buClr>
+              <a:buSzPct val="80000"/>
+              <a:buFont typeface="Wingdings 3" charset="2"/>
+              <a:buChar char=""/>
+              <a:defRPr sz="1200" b="0" i="0" kern="1200">
+                <a:solidFill>
+                  <a:schemeClr val="tx1">
+                    <a:lumMod val="75000"/>
+                    <a:lumOff val="25000"/>
+                  </a:schemeClr>
+                </a:solidFill>
+                <a:latin typeface="+mn-lt"/>
+                <a:ea typeface="+mn-ea"/>
+                <a:cs typeface="+mn-cs"/>
+              </a:defRPr>
+            </a:lvl7pPr>
+            <a:lvl8pPr marL="3429000" indent="-228600" algn="l" defTabSz="457200" rtl="0" eaLnBrk="1" latinLnBrk="0" hangingPunct="1">
+              <a:spcBef>
+                <a:spcPts val="1000"/>
+              </a:spcBef>
+              <a:spcAft>
+                <a:spcPts val="0"/>
+              </a:spcAft>
+              <a:buClr>
+                <a:schemeClr val="accent1"/>
+              </a:buClr>
+              <a:buSzPct val="80000"/>
+              <a:buFont typeface="Wingdings 3" charset="2"/>
+              <a:buChar char=""/>
+              <a:defRPr sz="1200" b="0" i="0" kern="1200">
+                <a:solidFill>
+                  <a:schemeClr val="tx1">
+                    <a:lumMod val="75000"/>
+                    <a:lumOff val="25000"/>
+                  </a:schemeClr>
+                </a:solidFill>
+                <a:latin typeface="+mn-lt"/>
+                <a:ea typeface="+mn-ea"/>
+                <a:cs typeface="+mn-cs"/>
+              </a:defRPr>
+            </a:lvl8pPr>
+            <a:lvl9pPr marL="3886200" indent="-228600" algn="l" defTabSz="457200" rtl="0" eaLnBrk="1" latinLnBrk="0" hangingPunct="1">
+              <a:spcBef>
+                <a:spcPts val="1000"/>
+              </a:spcBef>
+              <a:spcAft>
+                <a:spcPts val="0"/>
+              </a:spcAft>
+              <a:buClr>
+                <a:schemeClr val="accent1"/>
+              </a:buClr>
+              <a:buSzPct val="80000"/>
+              <a:buFont typeface="Wingdings 3" charset="2"/>
+              <a:buChar char=""/>
+              <a:defRPr sz="1200" b="0" i="0" kern="1200">
+                <a:solidFill>
+                  <a:schemeClr val="tx1">
+                    <a:lumMod val="75000"/>
+                    <a:lumOff val="25000"/>
+                  </a:schemeClr>
+                </a:solidFill>
+                <a:latin typeface="+mn-lt"/>
+                <a:ea typeface="+mn-ea"/>
+                <a:cs typeface="+mn-cs"/>
+              </a:defRPr>
+            </a:lvl9pPr>
+          </a:lstStyle>
+          <a:p>
+            <a:r>
+              <a:rPr lang="en-US" dirty="0"/>
+              <a:t>Resized 2D Slices</a:t>
+            </a:r>
+          </a:p>
+        </p:txBody>
+      </p:sp>
+      <p:pic>
+        <p:nvPicPr>
+          <p:cNvPr id="12" name="Picture 11"/>
+          <p:cNvPicPr>
+            <a:picLocks noChangeAspect="1"/>
+          </p:cNvPicPr>
+          <p:nvPr/>
+        </p:nvPicPr>
+        <p:blipFill>
+          <a:blip r:embed="rId4"/>
+          <a:stretch>
+            <a:fillRect/>
+          </a:stretch>
+        </p:blipFill>
+        <p:spPr>
+          <a:xfrm>
+            <a:off x="7836100" y="4248122"/>
+            <a:ext cx="3590925" cy="2409825"/>
+          </a:xfrm>
+          <a:prstGeom prst="rect">
+            <a:avLst/>
+          </a:prstGeom>
+        </p:spPr>
+      </p:pic>
+      <p:sp>
+        <p:nvSpPr>
+          <p:cNvPr id="13" name="Content Placeholder 2"/>
+          <p:cNvSpPr txBox="1">
+            <a:spLocks/>
+          </p:cNvSpPr>
+          <p:nvPr/>
+        </p:nvSpPr>
+        <p:spPr>
+          <a:xfrm>
+            <a:off x="8348206" y="3979582"/>
+            <a:ext cx="2566711" cy="268540"/>
+          </a:xfrm>
+          <a:prstGeom prst="rect">
+            <a:avLst/>
+          </a:prstGeom>
+        </p:spPr>
+        <p:txBody>
+          <a:bodyPr vert="horz" lIns="91440" tIns="45720" rIns="91440" bIns="45720" rtlCol="0">
+            <a:normAutofit fontScale="77500" lnSpcReduction="20000"/>
+          </a:bodyPr>
+          <a:lstStyle>
+            <a:lvl1pPr marL="342900" indent="-342900" algn="l" defTabSz="457200" rtl="0" eaLnBrk="1" latinLnBrk="0" hangingPunct="1">
+              <a:spcBef>
+                <a:spcPts val="1000"/>
+              </a:spcBef>
+              <a:spcAft>
+                <a:spcPts val="0"/>
+              </a:spcAft>
+              <a:buClr>
+                <a:schemeClr val="accent1"/>
+              </a:buClr>
+              <a:buSzPct val="80000"/>
+              <a:buFont typeface="Wingdings 3" charset="2"/>
+              <a:buChar char=""/>
+              <a:defRPr sz="1800" b="0" i="0" kern="1200">
+                <a:solidFill>
+                  <a:schemeClr val="tx1">
+                    <a:lumMod val="75000"/>
+                    <a:lumOff val="25000"/>
+                  </a:schemeClr>
+                </a:solidFill>
+                <a:latin typeface="+mn-lt"/>
+                <a:ea typeface="+mn-ea"/>
+                <a:cs typeface="+mn-cs"/>
+              </a:defRPr>
+            </a:lvl1pPr>
+            <a:lvl2pPr marL="742950" indent="-285750" algn="l" defTabSz="457200" rtl="0" eaLnBrk="1" latinLnBrk="0" hangingPunct="1">
+              <a:spcBef>
+                <a:spcPts val="1000"/>
+              </a:spcBef>
+              <a:spcAft>
+                <a:spcPts val="0"/>
+              </a:spcAft>
+              <a:buClr>
+                <a:schemeClr val="accent1"/>
+              </a:buClr>
+              <a:buSzPct val="80000"/>
+              <a:buFont typeface="Wingdings 3" charset="2"/>
+              <a:buChar char=""/>
+              <a:defRPr sz="1600" b="0" i="0" kern="1200">
+                <a:solidFill>
+                  <a:schemeClr val="tx1">
+                    <a:lumMod val="75000"/>
+                    <a:lumOff val="25000"/>
+                  </a:schemeClr>
+                </a:solidFill>
+                <a:latin typeface="+mn-lt"/>
+                <a:ea typeface="+mn-ea"/>
+                <a:cs typeface="+mn-cs"/>
+              </a:defRPr>
+            </a:lvl2pPr>
+            <a:lvl3pPr marL="1143000" indent="-228600" algn="l" defTabSz="457200" rtl="0" eaLnBrk="1" latinLnBrk="0" hangingPunct="1">
+              <a:spcBef>
+                <a:spcPts val="1000"/>
+              </a:spcBef>
+              <a:spcAft>
+                <a:spcPts val="0"/>
+              </a:spcAft>
+              <a:buClr>
+                <a:schemeClr val="accent1"/>
+              </a:buClr>
+              <a:buSzPct val="80000"/>
+              <a:buFont typeface="Wingdings 3" charset="2"/>
+              <a:buChar char=""/>
+              <a:defRPr sz="1400" b="0" i="0" kern="1200">
+                <a:solidFill>
+                  <a:schemeClr val="tx1">
+                    <a:lumMod val="75000"/>
+                    <a:lumOff val="25000"/>
+                  </a:schemeClr>
+                </a:solidFill>
+                <a:latin typeface="+mn-lt"/>
+                <a:ea typeface="+mn-ea"/>
+                <a:cs typeface="+mn-cs"/>
+              </a:defRPr>
+            </a:lvl3pPr>
+            <a:lvl4pPr marL="1600200" indent="-228600" algn="l" defTabSz="457200" rtl="0" eaLnBrk="1" latinLnBrk="0" hangingPunct="1">
+              <a:spcBef>
+                <a:spcPts val="1000"/>
+              </a:spcBef>
+              <a:spcAft>
+                <a:spcPts val="0"/>
+              </a:spcAft>
+              <a:buClr>
+                <a:schemeClr val="accent1"/>
+              </a:buClr>
+              <a:buSzPct val="80000"/>
+              <a:buFont typeface="Wingdings 3" charset="2"/>
+              <a:buChar char=""/>
+              <a:defRPr sz="1200" b="0" i="0" kern="1200">
+                <a:solidFill>
+                  <a:schemeClr val="tx1">
+                    <a:lumMod val="75000"/>
+                    <a:lumOff val="25000"/>
+                  </a:schemeClr>
+                </a:solidFill>
+                <a:latin typeface="+mn-lt"/>
+                <a:ea typeface="+mn-ea"/>
+                <a:cs typeface="+mn-cs"/>
+              </a:defRPr>
+            </a:lvl4pPr>
+            <a:lvl5pPr marL="2057400" indent="-228600" algn="l" defTabSz="457200" rtl="0" eaLnBrk="1" latinLnBrk="0" hangingPunct="1">
+              <a:spcBef>
+                <a:spcPts val="1000"/>
+              </a:spcBef>
+              <a:spcAft>
+                <a:spcPts val="0"/>
+              </a:spcAft>
+              <a:buClr>
+                <a:schemeClr val="accent1"/>
+              </a:buClr>
+              <a:buSzPct val="80000"/>
+              <a:buFont typeface="Wingdings 3" charset="2"/>
+              <a:buChar char=""/>
+              <a:defRPr sz="1200" b="0" i="0" kern="1200">
+                <a:solidFill>
+                  <a:schemeClr val="tx1">
+                    <a:lumMod val="75000"/>
+                    <a:lumOff val="25000"/>
+                  </a:schemeClr>
+                </a:solidFill>
+                <a:latin typeface="+mn-lt"/>
+                <a:ea typeface="+mn-ea"/>
+                <a:cs typeface="+mn-cs"/>
+              </a:defRPr>
+            </a:lvl5pPr>
+            <a:lvl6pPr marL="2514600" indent="-228600" algn="l" defTabSz="457200" rtl="0" eaLnBrk="1" latinLnBrk="0" hangingPunct="1">
+              <a:spcBef>
+                <a:spcPts val="1000"/>
+              </a:spcBef>
+              <a:spcAft>
+                <a:spcPts val="0"/>
+              </a:spcAft>
+              <a:buClr>
+                <a:schemeClr val="accent1"/>
+              </a:buClr>
+              <a:buSzPct val="80000"/>
+              <a:buFont typeface="Wingdings 3" charset="2"/>
+              <a:buChar char=""/>
+              <a:defRPr sz="1200" b="0" i="0" kern="1200">
+                <a:solidFill>
+                  <a:schemeClr val="tx1">
+                    <a:lumMod val="75000"/>
+                    <a:lumOff val="25000"/>
+                  </a:schemeClr>
+                </a:solidFill>
+                <a:latin typeface="+mn-lt"/>
+                <a:ea typeface="+mn-ea"/>
+                <a:cs typeface="+mn-cs"/>
+              </a:defRPr>
+            </a:lvl6pPr>
+            <a:lvl7pPr marL="2971800" indent="-228600" algn="l" defTabSz="457200" rtl="0" eaLnBrk="1" latinLnBrk="0" hangingPunct="1">
+              <a:spcBef>
+                <a:spcPts val="1000"/>
+              </a:spcBef>
+              <a:spcAft>
+                <a:spcPts val="0"/>
+              </a:spcAft>
+              <a:buClr>
+                <a:schemeClr val="accent1"/>
+              </a:buClr>
+              <a:buSzPct val="80000"/>
+              <a:buFont typeface="Wingdings 3" charset="2"/>
+              <a:buChar char=""/>
+              <a:defRPr sz="1200" b="0" i="0" kern="1200">
+                <a:solidFill>
+                  <a:schemeClr val="tx1">
+                    <a:lumMod val="75000"/>
+                    <a:lumOff val="25000"/>
+                  </a:schemeClr>
+                </a:solidFill>
+                <a:latin typeface="+mn-lt"/>
+                <a:ea typeface="+mn-ea"/>
+                <a:cs typeface="+mn-cs"/>
+              </a:defRPr>
+            </a:lvl7pPr>
+            <a:lvl8pPr marL="3429000" indent="-228600" algn="l" defTabSz="457200" rtl="0" eaLnBrk="1" latinLnBrk="0" hangingPunct="1">
+              <a:spcBef>
+                <a:spcPts val="1000"/>
+              </a:spcBef>
+              <a:spcAft>
+                <a:spcPts val="0"/>
+              </a:spcAft>
+              <a:buClr>
+                <a:schemeClr val="accent1"/>
+              </a:buClr>
+              <a:buSzPct val="80000"/>
+              <a:buFont typeface="Wingdings 3" charset="2"/>
+              <a:buChar char=""/>
+              <a:defRPr sz="1200" b="0" i="0" kern="1200">
+                <a:solidFill>
+                  <a:schemeClr val="tx1">
+                    <a:lumMod val="75000"/>
+                    <a:lumOff val="25000"/>
+                  </a:schemeClr>
+                </a:solidFill>
+                <a:latin typeface="+mn-lt"/>
+                <a:ea typeface="+mn-ea"/>
+                <a:cs typeface="+mn-cs"/>
+              </a:defRPr>
+            </a:lvl8pPr>
+            <a:lvl9pPr marL="3886200" indent="-228600" algn="l" defTabSz="457200" rtl="0" eaLnBrk="1" latinLnBrk="0" hangingPunct="1">
+              <a:spcBef>
+                <a:spcPts val="1000"/>
+              </a:spcBef>
+              <a:spcAft>
+                <a:spcPts val="0"/>
+              </a:spcAft>
+              <a:buClr>
+                <a:schemeClr val="accent1"/>
+              </a:buClr>
+              <a:buSzPct val="80000"/>
+              <a:buFont typeface="Wingdings 3" charset="2"/>
+              <a:buChar char=""/>
+              <a:defRPr sz="1200" b="0" i="0" kern="1200">
+                <a:solidFill>
+                  <a:schemeClr val="tx1">
+                    <a:lumMod val="75000"/>
+                    <a:lumOff val="25000"/>
+                  </a:schemeClr>
+                </a:solidFill>
+                <a:latin typeface="+mn-lt"/>
+                <a:ea typeface="+mn-ea"/>
+                <a:cs typeface="+mn-cs"/>
+              </a:defRPr>
+            </a:lvl9pPr>
+          </a:lstStyle>
+          <a:p>
+            <a:r>
+              <a:rPr lang="en-US" dirty="0"/>
+              <a:t>20 “Chunks” per </a:t>
+            </a:r>
+            <a:r>
+              <a:rPr lang="en-US" dirty="0" err="1"/>
+              <a:t>Dicom</a:t>
+            </a:r>
+            <a:endParaRPr lang="en-US" dirty="0"/>
+          </a:p>
+        </p:txBody>
+      </p:sp>
+    </p:spTree>
+    <p:extLst>
+      <p:ext uri="{BB962C8B-B14F-4D97-AF65-F5344CB8AC3E}">
+        <p14:creationId xmlns:p14="http://schemas.microsoft.com/office/powerpoint/2010/main" val="2184865259"/>
+      </p:ext>
+    </p:extLst>
+  </p:cSld>
+  <p:clrMapOvr>
+    <a:masterClrMapping/>
+  </p:clrMapOvr>
+</p:sld>
+</file>
+
+<file path=ppt/slides/slide4.xml><?xml version="1.0" encoding="utf-8"?>
+<p:sld xmlns:a="http://schemas.openxmlformats.org/drawingml/2006/main" xmlns:r="http://schemas.openxmlformats.org/officeDocument/2006/relationships" xmlns:p="http://schemas.openxmlformats.org/presentationml/2006/main">
+  <p:cSld>
+    <p:spTree>
+      <p:nvGrpSpPr>
+        <p:cNvPr id="1" name=""/>
+        <p:cNvGrpSpPr/>
+        <p:nvPr/>
+      </p:nvGrpSpPr>
+      <p:grpSpPr>
+        <a:xfrm>
+          <a:off x="0" y="0"/>
+          <a:ext cx="0" cy="0"/>
+          <a:chOff x="0" y="0"/>
+          <a:chExt cx="0" cy="0"/>
+        </a:xfrm>
+      </p:grpSpPr>
+      <p:sp>
+        <p:nvSpPr>
+          <p:cNvPr id="2" name="Title 1"/>
+          <p:cNvSpPr>
+            <a:spLocks noGrp="1"/>
+          </p:cNvSpPr>
+          <p:nvPr>
+            <p:ph type="title"/>
+          </p:nvPr>
+        </p:nvSpPr>
+        <p:spPr/>
+        <p:txBody>
+          <a:bodyPr/>
+          <a:lstStyle/>
+          <a:p>
+            <a:r>
+              <a:rPr lang="en-US" dirty="0"/>
+              <a:t>Pre-Process Data for 3D CNN</a:t>
+            </a:r>
+          </a:p>
+        </p:txBody>
+      </p:sp>
+      <p:sp>
+        <p:nvSpPr>
+          <p:cNvPr id="3" name="Content Placeholder 2"/>
+          <p:cNvSpPr>
+            <a:spLocks noGrp="1"/>
+          </p:cNvSpPr>
+          <p:nvPr>
+            <p:ph idx="1"/>
+          </p:nvPr>
+        </p:nvSpPr>
+        <p:spPr/>
+        <p:txBody>
+          <a:bodyPr/>
+          <a:lstStyle/>
+          <a:p>
+            <a:endParaRPr lang="en-US"/>
+          </a:p>
+        </p:txBody>
+      </p:sp>
+    </p:spTree>
+    <p:extLst>
+      <p:ext uri="{BB962C8B-B14F-4D97-AF65-F5344CB8AC3E}">
+        <p14:creationId xmlns:p14="http://schemas.microsoft.com/office/powerpoint/2010/main" val="455549977"/>
       </p:ext>
     </p:extLst>
   </p:cSld>

</xml_diff>

<commit_message>
added the pre processing page to ppt
</commit_message>
<xml_diff>
--- a/CSI 758 Project Spring 2017 Bruce Goldfeder.pptx
+++ b/CSI 758 Project Spring 2017 Bruce Goldfeder.pptx
@@ -9,6 +9,7 @@
     <p:sldId id="257" r:id="rId3"/>
     <p:sldId id="258" r:id="rId4"/>
     <p:sldId id="259" r:id="rId5"/>
+    <p:sldId id="260" r:id="rId6"/>
   </p:sldIdLst>
   <p:sldSz cx="12192000" cy="6858000"/>
   <p:notesSz cx="6858000" cy="9144000"/>
@@ -455,7 +456,7 @@
             <a:fld id="{5923F103-BC34-4FE4-A40E-EDDEECFDA5D0}" type="datetimeFigureOut">
               <a:rPr lang="en-US" dirty="0"/>
               <a:pPr/>
-              <a:t>5/3/2017</a:t>
+              <a:t>5/4/2017</a:t>
             </a:fld>
             <a:endParaRPr lang="en-US" dirty="0"/>
           </a:p>
@@ -1543,7 +1544,7 @@
           <a:p>
             <a:fld id="{923A1CC3-2375-41D4-9E03-427CAF2A4C1A}" type="datetimeFigureOut">
               <a:rPr lang="en-US" dirty="0"/>
-              <a:t>5/3/2017</a:t>
+              <a:t>5/4/2017</a:t>
             </a:fld>
             <a:endParaRPr lang="en-US" dirty="0"/>
           </a:p>
@@ -2523,7 +2524,7 @@
           <a:p>
             <a:fld id="{AFF16868-8199-4C2C-A5B1-63AEE139F88E}" type="datetimeFigureOut">
               <a:rPr lang="en-US" dirty="0"/>
-              <a:t>5/3/2017</a:t>
+              <a:t>5/4/2017</a:t>
             </a:fld>
             <a:endParaRPr lang="en-US" dirty="0"/>
           </a:p>
@@ -3657,7 +3658,7 @@
           <a:p>
             <a:fld id="{AAD9FF7F-6988-44CC-821B-644E70CD2F73}" type="datetimeFigureOut">
               <a:rPr lang="en-US" dirty="0"/>
-              <a:t>5/3/2017</a:t>
+              <a:t>5/4/2017</a:t>
             </a:fld>
             <a:endParaRPr lang="en-US" dirty="0"/>
           </a:p>
@@ -4690,7 +4691,7 @@
           <a:p>
             <a:fld id="{5C12C299-16B2-4475-990D-751901EACC14}" type="datetimeFigureOut">
               <a:rPr lang="en-US" dirty="0"/>
-              <a:t>5/3/2017</a:t>
+              <a:t>5/4/2017</a:t>
             </a:fld>
             <a:endParaRPr lang="en-US" dirty="0"/>
           </a:p>
@@ -5350,7 +5351,7 @@
           <a:p>
             <a:fld id="{9FE86839-B9D8-4651-8783-F325ECE74E65}" type="datetimeFigureOut">
               <a:rPr lang="en-US" dirty="0"/>
-              <a:t>5/3/2017</a:t>
+              <a:t>5/4/2017</a:t>
             </a:fld>
             <a:endParaRPr lang="en-US" dirty="0"/>
           </a:p>
@@ -6211,7 +6212,7 @@
           <a:p>
             <a:fld id="{FD484F64-32F6-45C5-931F-ADC1662401D0}" type="datetimeFigureOut">
               <a:rPr lang="en-US" dirty="0"/>
-              <a:t>5/3/2017</a:t>
+              <a:t>5/4/2017</a:t>
             </a:fld>
             <a:endParaRPr lang="en-US" dirty="0"/>
           </a:p>
@@ -6401,7 +6402,7 @@
           <a:p>
             <a:fld id="{53086D93-FCAC-47E0-A2EE-787E62CA814C}" type="datetimeFigureOut">
               <a:rPr lang="en-US" dirty="0"/>
-              <a:t>5/3/2017</a:t>
+              <a:t>5/4/2017</a:t>
             </a:fld>
             <a:endParaRPr lang="en-US" dirty="0"/>
           </a:p>
@@ -7373,7 +7374,7 @@
           <a:p>
             <a:fld id="{CDA879A6-0FD0-4734-A311-86BFCA472E6E}" type="datetimeFigureOut">
               <a:rPr lang="en-US" dirty="0"/>
-              <a:t>5/3/2017</a:t>
+              <a:t>5/4/2017</a:t>
             </a:fld>
             <a:endParaRPr lang="en-US" dirty="0"/>
           </a:p>
@@ -7584,7 +7585,7 @@
           <a:p>
             <a:fld id="{19C9CA7B-DFD4-44B5-8C60-D14B8CD1FB59}" type="datetimeFigureOut">
               <a:rPr lang="en-US" dirty="0"/>
-              <a:t>5/3/2017</a:t>
+              <a:t>5/4/2017</a:t>
             </a:fld>
             <a:endParaRPr lang="en-US" dirty="0"/>
           </a:p>
@@ -8618,7 +8619,7 @@
           <a:p>
             <a:fld id="{F34E6425-0181-43F2-84FC-787E803FD2F8}" type="datetimeFigureOut">
               <a:rPr lang="en-US" dirty="0"/>
-              <a:t>5/3/2017</a:t>
+              <a:t>5/4/2017</a:t>
             </a:fld>
             <a:endParaRPr lang="en-US" dirty="0"/>
           </a:p>
@@ -8890,7 +8891,7 @@
           <a:p>
             <a:fld id="{3BDB8791-F1B0-41E7-B7FD-A781E65C4266}" type="datetimeFigureOut">
               <a:rPr lang="en-US" dirty="0"/>
-              <a:t>5/3/2017</a:t>
+              <a:t>5/4/2017</a:t>
             </a:fld>
             <a:endParaRPr lang="en-US" dirty="0"/>
           </a:p>
@@ -9300,7 +9301,7 @@
           <a:p>
             <a:fld id="{5FDD63B2-E120-4ED8-B27B-C685F510A5FE}" type="datetimeFigureOut">
               <a:rPr lang="en-US" dirty="0"/>
-              <a:t>5/3/2017</a:t>
+              <a:t>5/4/2017</a:t>
             </a:fld>
             <a:endParaRPr lang="en-US" dirty="0"/>
           </a:p>
@@ -9427,7 +9428,7 @@
           <a:p>
             <a:fld id="{7AA18ACC-A947-437B-A130-35BD54FDF1E9}" type="datetimeFigureOut">
               <a:rPr lang="en-US" dirty="0"/>
-              <a:t>5/3/2017</a:t>
+              <a:t>5/4/2017</a:t>
             </a:fld>
             <a:endParaRPr lang="en-US" dirty="0"/>
           </a:p>
@@ -9522,7 +9523,7 @@
           <a:p>
             <a:fld id="{7C8D7E02-BCB8-4D50-A234-369438C08659}" type="datetimeFigureOut">
               <a:rPr lang="en-US" dirty="0"/>
-              <a:t>5/3/2017</a:t>
+              <a:t>5/4/2017</a:t>
             </a:fld>
             <a:endParaRPr lang="en-US" dirty="0"/>
           </a:p>
@@ -10603,7 +10604,7 @@
           <a:p>
             <a:fld id="{76E86A4C-8E40-4F87-A4F0-01A0687C5742}" type="datetimeFigureOut">
               <a:rPr lang="en-US" dirty="0"/>
-              <a:t>5/3/2017</a:t>
+              <a:t>5/4/2017</a:t>
             </a:fld>
             <a:endParaRPr lang="en-US" dirty="0"/>
           </a:p>
@@ -11711,7 +11712,7 @@
           <a:p>
             <a:fld id="{35E72C73-2D91-4E12-BA25-F0AA0C03599B}" type="datetimeFigureOut">
               <a:rPr lang="en-US" dirty="0"/>
-              <a:t>5/3/2017</a:t>
+              <a:t>5/4/2017</a:t>
             </a:fld>
             <a:endParaRPr lang="en-US" dirty="0"/>
           </a:p>
@@ -12708,7 +12709,7 @@
           <a:p>
             <a:fld id="{2BE451C3-0FF4-47C4-B829-773ADF60F88C}" type="datetimeFigureOut">
               <a:rPr lang="en-US" dirty="0"/>
-              <a:t>5/3/2017</a:t>
+              <a:t>5/4/2017</a:t>
             </a:fld>
             <a:endParaRPr lang="en-US" dirty="0"/>
           </a:p>
@@ -15480,12 +15481,58 @@
             <p:ph idx="1"/>
           </p:nvPr>
         </p:nvSpPr>
-        <p:spPr/>
+        <p:spPr>
+          <a:xfrm>
+            <a:off x="1154954" y="2603500"/>
+            <a:ext cx="8825659" cy="3416300"/>
+          </a:xfrm>
+        </p:spPr>
         <p:txBody>
           <a:bodyPr/>
           <a:lstStyle/>
           <a:p>
-            <a:endParaRPr lang="en-US"/>
+            <a:r>
+              <a:rPr lang="en-US" dirty="0"/>
+              <a:t>Needed to accommodate variance in number of images per </a:t>
+            </a:r>
+            <a:r>
+              <a:rPr lang="en-US" dirty="0" err="1"/>
+              <a:t>Dicom</a:t>
+            </a:r>
+            <a:endParaRPr lang="en-US" dirty="0"/>
+          </a:p>
+          <a:p>
+            <a:r>
+              <a:rPr lang="en-US" dirty="0"/>
+              <a:t>Used chunking function with adjustments</a:t>
+            </a:r>
+          </a:p>
+          <a:p>
+            <a:pPr lvl="1"/>
+            <a:r>
+              <a:rPr lang="en-US" dirty="0"/>
+              <a:t>Approximated the number of images to get 20 groups of adjacent images</a:t>
+            </a:r>
+          </a:p>
+          <a:p>
+            <a:pPr lvl="1"/>
+            <a:r>
+              <a:rPr lang="en-US" dirty="0"/>
+              <a:t>Averaged the pixel values over the range of adjacent images to normalize for each group</a:t>
+            </a:r>
+          </a:p>
+          <a:p>
+            <a:pPr lvl="2"/>
+            <a:r>
+              <a:rPr lang="en-US" dirty="0"/>
+              <a:t>Some data fidelity loss – estimate that tumor size that could be observed moved from millimeters to about a centimeter in size due to averaging.</a:t>
+            </a:r>
+          </a:p>
+          <a:p>
+            <a:r>
+              <a:rPr lang="en-US" dirty="0"/>
+              <a:t>Result was approximately 1500 images each with 50 pixels by 50 pixels by 20 images – this is the basis for the common 3D model to be input to the CNN</a:t>
+            </a:r>
           </a:p>
         </p:txBody>
       </p:sp>
@@ -15493,6 +15540,77 @@
     <p:extLst>
       <p:ext uri="{BB962C8B-B14F-4D97-AF65-F5344CB8AC3E}">
         <p14:creationId xmlns:p14="http://schemas.microsoft.com/office/powerpoint/2010/main" val="455549977"/>
+      </p:ext>
+    </p:extLst>
+  </p:cSld>
+  <p:clrMapOvr>
+    <a:masterClrMapping/>
+  </p:clrMapOvr>
+</p:sld>
+</file>
+
+<file path=ppt/slides/slide5.xml><?xml version="1.0" encoding="utf-8"?>
+<p:sld xmlns:a="http://schemas.openxmlformats.org/drawingml/2006/main" xmlns:r="http://schemas.openxmlformats.org/officeDocument/2006/relationships" xmlns:p="http://schemas.openxmlformats.org/presentationml/2006/main">
+  <p:cSld>
+    <p:spTree>
+      <p:nvGrpSpPr>
+        <p:cNvPr id="1" name=""/>
+        <p:cNvGrpSpPr/>
+        <p:nvPr/>
+      </p:nvGrpSpPr>
+      <p:grpSpPr>
+        <a:xfrm>
+          <a:off x="0" y="0"/>
+          <a:ext cx="0" cy="0"/>
+          <a:chOff x="0" y="0"/>
+          <a:chExt cx="0" cy="0"/>
+        </a:xfrm>
+      </p:grpSpPr>
+      <p:sp>
+        <p:nvSpPr>
+          <p:cNvPr id="2" name="Title 1"/>
+          <p:cNvSpPr>
+            <a:spLocks noGrp="1"/>
+          </p:cNvSpPr>
+          <p:nvPr>
+            <p:ph type="title"/>
+          </p:nvPr>
+        </p:nvSpPr>
+        <p:spPr/>
+        <p:txBody>
+          <a:bodyPr/>
+          <a:lstStyle/>
+          <a:p>
+            <a:r>
+              <a:rPr lang="en-US" dirty="0"/>
+              <a:t>3D CNN Using Tensor Flow</a:t>
+            </a:r>
+          </a:p>
+        </p:txBody>
+      </p:sp>
+      <p:sp>
+        <p:nvSpPr>
+          <p:cNvPr id="3" name="Content Placeholder 2"/>
+          <p:cNvSpPr>
+            <a:spLocks noGrp="1"/>
+          </p:cNvSpPr>
+          <p:nvPr>
+            <p:ph idx="1"/>
+          </p:nvPr>
+        </p:nvSpPr>
+        <p:spPr/>
+        <p:txBody>
+          <a:bodyPr/>
+          <a:lstStyle/>
+          <a:p>
+            <a:endParaRPr lang="en-US"/>
+          </a:p>
+        </p:txBody>
+      </p:sp>
+    </p:spTree>
+    <p:extLst>
+      <p:ext uri="{BB962C8B-B14F-4D97-AF65-F5344CB8AC3E}">
+        <p14:creationId xmlns:p14="http://schemas.microsoft.com/office/powerpoint/2010/main" val="253138261"/>
       </p:ext>
     </p:extLst>
   </p:cSld>

</xml_diff>

<commit_message>
added page on Tensor Flow to ppt
</commit_message>
<xml_diff>
--- a/CSI 758 Project Spring 2017 Bruce Goldfeder.pptx
+++ b/CSI 758 Project Spring 2017 Bruce Goldfeder.pptx
@@ -15598,12 +15598,244 @@
             <p:ph idx="1"/>
           </p:nvPr>
         </p:nvSpPr>
-        <p:spPr/>
+        <p:spPr>
+          <a:xfrm>
+            <a:off x="1154955" y="2603500"/>
+            <a:ext cx="6146598" cy="3933778"/>
+          </a:xfrm>
+        </p:spPr>
         <p:txBody>
-          <a:bodyPr/>
+          <a:bodyPr>
+            <a:normAutofit/>
+          </a:bodyPr>
           <a:lstStyle/>
           <a:p>
-            <a:endParaRPr lang="en-US"/>
+            <a:r>
+              <a:rPr lang="en-US" dirty="0"/>
+              <a:t>Difficult to install – both hardware and software dependencies</a:t>
+            </a:r>
+          </a:p>
+          <a:p>
+            <a:pPr lvl="1"/>
+            <a:r>
+              <a:rPr lang="en-US" dirty="0"/>
+              <a:t>In future will use pre-built AWS Data Science AMI on Ubuntu</a:t>
+            </a:r>
+          </a:p>
+          <a:p>
+            <a:pPr lvl="1"/>
+            <a:r>
+              <a:rPr lang="en-US" dirty="0"/>
+              <a:t>Not Instance Type transportable</a:t>
+            </a:r>
+          </a:p>
+          <a:p>
+            <a:r>
+              <a:rPr lang="en-US" dirty="0"/>
+              <a:t>Data was reduced dramatically</a:t>
+            </a:r>
+          </a:p>
+          <a:p>
+            <a:pPr lvl="1"/>
+            <a:r>
+              <a:rPr lang="en-US" dirty="0"/>
+              <a:t>512x512x200 = 52MB to 50x50x20 = 50K;  99.9% loss</a:t>
+            </a:r>
+          </a:p>
+          <a:p>
+            <a:pPr lvl="1"/>
+            <a:r>
+              <a:rPr lang="en-US" dirty="0"/>
+              <a:t>Still this was a large amount of data for a CNN</a:t>
+            </a:r>
+          </a:p>
+          <a:p>
+            <a:pPr lvl="2"/>
+            <a:r>
+              <a:rPr lang="en-US" dirty="0"/>
+              <a:t>Works great on 2D kitten images of 64x64 = 4K</a:t>
+            </a:r>
+          </a:p>
+          <a:p>
+            <a:r>
+              <a:rPr lang="en-US" dirty="0"/>
+              <a:t>Not enough data samples</a:t>
+            </a:r>
+          </a:p>
+          <a:p>
+            <a:pPr lvl="1"/>
+            <a:r>
+              <a:rPr lang="en-US" dirty="0"/>
+              <a:t>CNN wants 100K or more sample size</a:t>
+            </a:r>
+          </a:p>
+          <a:p>
+            <a:endParaRPr lang="en-US" dirty="0"/>
+          </a:p>
+        </p:txBody>
+      </p:sp>
+      <p:sp>
+        <p:nvSpPr>
+          <p:cNvPr id="4" name="Rectangle 3"/>
+          <p:cNvSpPr/>
+          <p:nvPr/>
+        </p:nvSpPr>
+        <p:spPr>
+          <a:xfrm>
+            <a:off x="7415284" y="2400564"/>
+            <a:ext cx="4021540" cy="4339650"/>
+          </a:xfrm>
+          <a:prstGeom prst="rect">
+            <a:avLst/>
+          </a:prstGeom>
+          <a:ln>
+            <a:solidFill>
+              <a:schemeClr val="accent1"/>
+            </a:solidFill>
+          </a:ln>
+        </p:spPr>
+        <p:txBody>
+          <a:bodyPr wrap="square">
+            <a:spAutoFit/>
+          </a:bodyPr>
+          <a:lstStyle/>
+          <a:p>
+            <a:r>
+              <a:rPr lang="en-US" sz="1200" dirty="0"/>
+              <a:t>Epoch 1 completed out of 10 loss: 238734260925.0</a:t>
+            </a:r>
+          </a:p>
+          <a:p>
+            <a:r>
+              <a:rPr lang="en-US" sz="1200" dirty="0"/>
+              <a:t>Accuracy: 0.6</a:t>
+            </a:r>
+          </a:p>
+          <a:p>
+            <a:r>
+              <a:rPr lang="en-US" sz="1200" dirty="0"/>
+              <a:t>Epoch 2 completed out of 10 loss: 18683134593.9</a:t>
+            </a:r>
+          </a:p>
+          <a:p>
+            <a:r>
+              <a:rPr lang="en-US" sz="1200" dirty="0"/>
+              <a:t>Accuracy: 0.7</a:t>
+            </a:r>
+          </a:p>
+          <a:p>
+            <a:r>
+              <a:rPr lang="en-US" sz="1200" dirty="0"/>
+              <a:t>Epoch 3 completed out of 10 loss: 7478595325.29</a:t>
+            </a:r>
+          </a:p>
+          <a:p>
+            <a:r>
+              <a:rPr lang="en-US" sz="1200" dirty="0"/>
+              <a:t>Accuracy: 0.7</a:t>
+            </a:r>
+          </a:p>
+          <a:p>
+            <a:r>
+              <a:rPr lang="en-US" sz="1200" dirty="0"/>
+              <a:t>Epoch 4 completed out of 10 loss: 3809845549.84</a:t>
+            </a:r>
+          </a:p>
+          <a:p>
+            <a:r>
+              <a:rPr lang="en-US" sz="1200" dirty="0"/>
+              <a:t>Accuracy: 0.9</a:t>
+            </a:r>
+          </a:p>
+          <a:p>
+            <a:r>
+              <a:rPr lang="en-US" sz="1200" dirty="0"/>
+              <a:t>Epoch 5 completed out of 10 loss: 2490083642.7</a:t>
+            </a:r>
+          </a:p>
+          <a:p>
+            <a:r>
+              <a:rPr lang="en-US" sz="1200" dirty="0"/>
+              <a:t>Accuracy: 0.4</a:t>
+            </a:r>
+          </a:p>
+          <a:p>
+            <a:r>
+              <a:rPr lang="en-US" sz="1200" dirty="0"/>
+              <a:t>Epoch 6 completed out of 10 loss: 1678082050.97</a:t>
+            </a:r>
+          </a:p>
+          <a:p>
+            <a:r>
+              <a:rPr lang="en-US" sz="1200" dirty="0"/>
+              <a:t>Accuracy: 0.5</a:t>
+            </a:r>
+          </a:p>
+          <a:p>
+            <a:r>
+              <a:rPr lang="en-US" sz="1200" dirty="0"/>
+              <a:t>Epoch 7 completed out of 10 loss: 1223602945.69</a:t>
+            </a:r>
+          </a:p>
+          <a:p>
+            <a:r>
+              <a:rPr lang="en-US" sz="1200" dirty="0"/>
+              <a:t>Accuracy: 0.6</a:t>
+            </a:r>
+          </a:p>
+          <a:p>
+            <a:r>
+              <a:rPr lang="en-US" sz="1200" dirty="0"/>
+              <a:t>Epoch 8 completed out of 10 loss: 760098937.574</a:t>
+            </a:r>
+          </a:p>
+          <a:p>
+            <a:r>
+              <a:rPr lang="en-US" sz="1200" dirty="0"/>
+              <a:t>Accuracy: 0.8</a:t>
+            </a:r>
+          </a:p>
+          <a:p>
+            <a:r>
+              <a:rPr lang="en-US" sz="1200" dirty="0"/>
+              <a:t>Epoch 9 completed out of 10 loss: 433012339.411</a:t>
+            </a:r>
+          </a:p>
+          <a:p>
+            <a:r>
+              <a:rPr lang="en-US" sz="1200" dirty="0"/>
+              <a:t>Accuracy: 0.9</a:t>
+            </a:r>
+          </a:p>
+          <a:p>
+            <a:r>
+              <a:rPr lang="en-US" sz="1200" dirty="0"/>
+              <a:t>Epoch 10 completed out of 10 loss: 242587365.832</a:t>
+            </a:r>
+          </a:p>
+          <a:p>
+            <a:r>
+              <a:rPr lang="en-US" sz="1200" dirty="0"/>
+              <a:t>Accuracy: 0.6</a:t>
+            </a:r>
+          </a:p>
+          <a:p>
+            <a:r>
+              <a:rPr lang="en-US" sz="1200" dirty="0"/>
+              <a:t>Done. Finishing accuracy:</a:t>
+            </a:r>
+          </a:p>
+          <a:p>
+            <a:r>
+              <a:rPr lang="en-US" sz="1200" dirty="0"/>
+              <a:t>Accuracy: 0.7</a:t>
+            </a:r>
+          </a:p>
+          <a:p>
+            <a:r>
+              <a:rPr lang="en-US" sz="1200" dirty="0"/>
+              <a:t>fitment percent: 0.9992790194664743</a:t>
+            </a:r>
           </a:p>
         </p:txBody>
       </p:sp>

</xml_diff>

<commit_message>
done and ready for presentation
</commit_message>
<xml_diff>
--- a/CSI 758 Project Spring 2017 Bruce Goldfeder.pptx
+++ b/CSI 758 Project Spring 2017 Bruce Goldfeder.pptx
@@ -10,6 +10,8 @@
     <p:sldId id="258" r:id="rId4"/>
     <p:sldId id="259" r:id="rId5"/>
     <p:sldId id="260" r:id="rId6"/>
+    <p:sldId id="261" r:id="rId7"/>
+    <p:sldId id="262" r:id="rId8"/>
   </p:sldIdLst>
   <p:sldSz cx="12192000" cy="6858000"/>
   <p:notesSz cx="6858000" cy="9144000"/>
@@ -15852,6 +15854,471 @@
 </p:sld>
 </file>
 
+<file path=ppt/slides/slide6.xml><?xml version="1.0" encoding="utf-8"?>
+<p:sld xmlns:a="http://schemas.openxmlformats.org/drawingml/2006/main" xmlns:r="http://schemas.openxmlformats.org/officeDocument/2006/relationships" xmlns:p="http://schemas.openxmlformats.org/presentationml/2006/main">
+  <p:cSld>
+    <p:spTree>
+      <p:nvGrpSpPr>
+        <p:cNvPr id="1" name=""/>
+        <p:cNvGrpSpPr/>
+        <p:nvPr/>
+      </p:nvGrpSpPr>
+      <p:grpSpPr>
+        <a:xfrm>
+          <a:off x="0" y="0"/>
+          <a:ext cx="0" cy="0"/>
+          <a:chOff x="0" y="0"/>
+          <a:chExt cx="0" cy="0"/>
+        </a:xfrm>
+      </p:grpSpPr>
+      <p:sp>
+        <p:nvSpPr>
+          <p:cNvPr id="2" name="Title 1"/>
+          <p:cNvSpPr>
+            <a:spLocks noGrp="1"/>
+          </p:cNvSpPr>
+          <p:nvPr>
+            <p:ph type="title"/>
+          </p:nvPr>
+        </p:nvSpPr>
+        <p:spPr/>
+        <p:txBody>
+          <a:bodyPr/>
+          <a:lstStyle/>
+          <a:p>
+            <a:r>
+              <a:rPr lang="en-US" dirty="0"/>
+              <a:t>Apply Domain Knowledge</a:t>
+            </a:r>
+          </a:p>
+        </p:txBody>
+      </p:sp>
+      <p:sp>
+        <p:nvSpPr>
+          <p:cNvPr id="3" name="Content Placeholder 2"/>
+          <p:cNvSpPr>
+            <a:spLocks noGrp="1"/>
+          </p:cNvSpPr>
+          <p:nvPr>
+            <p:ph idx="1"/>
+          </p:nvPr>
+        </p:nvSpPr>
+        <p:spPr>
+          <a:xfrm>
+            <a:off x="449101" y="2555374"/>
+            <a:ext cx="7571951" cy="3813342"/>
+          </a:xfrm>
+        </p:spPr>
+        <p:txBody>
+          <a:bodyPr>
+            <a:normAutofit fontScale="85000" lnSpcReduction="20000"/>
+          </a:bodyPr>
+          <a:lstStyle/>
+          <a:p>
+            <a:r>
+              <a:rPr lang="en-US" dirty="0"/>
+              <a:t>Hooray, a successful data ingestion, transformation, and CNN run!</a:t>
+            </a:r>
+          </a:p>
+          <a:p>
+            <a:r>
+              <a:rPr lang="en-US" dirty="0"/>
+              <a:t>Now for the hard part </a:t>
+            </a:r>
+            <a:r>
+              <a:rPr lang="en-US" dirty="0">
+                <a:sym typeface="Wingdings" panose="05000000000000000000" pitchFamily="2" charset="2"/>
+              </a:rPr>
+              <a:t> Apply Domain Knowledge, Semantics, Ontology</a:t>
+            </a:r>
+          </a:p>
+          <a:p>
+            <a:r>
+              <a:rPr lang="en-US" dirty="0">
+                <a:sym typeface="Wingdings" panose="05000000000000000000" pitchFamily="2" charset="2"/>
+              </a:rPr>
+              <a:t>Also apply further normalization and conditioning of the data</a:t>
+            </a:r>
+          </a:p>
+          <a:p>
+            <a:r>
+              <a:rPr lang="en-US" dirty="0">
+                <a:sym typeface="Wingdings" panose="05000000000000000000" pitchFamily="2" charset="2"/>
+              </a:rPr>
+              <a:t>Apply the following set of steps (thanks to Guido </a:t>
+            </a:r>
+            <a:r>
+              <a:rPr lang="en-US" dirty="0" err="1">
+                <a:sym typeface="Wingdings" panose="05000000000000000000" pitchFamily="2" charset="2"/>
+              </a:rPr>
+              <a:t>Zhuidhoff</a:t>
+            </a:r>
+            <a:r>
+              <a:rPr lang="en-US" dirty="0">
+                <a:sym typeface="Wingdings" panose="05000000000000000000" pitchFamily="2" charset="2"/>
+              </a:rPr>
+              <a:t>)</a:t>
+            </a:r>
+          </a:p>
+          <a:p>
+            <a:pPr lvl="1"/>
+            <a:r>
+              <a:rPr lang="en-US" b="1" dirty="0"/>
+              <a:t>Loading the DICOM files</a:t>
+            </a:r>
+            <a:r>
+              <a:rPr lang="en-US" dirty="0"/>
+              <a:t>, and adding missing metadata</a:t>
+            </a:r>
+          </a:p>
+          <a:p>
+            <a:pPr lvl="1"/>
+            <a:r>
+              <a:rPr lang="en-US" b="1" dirty="0"/>
+              <a:t>Converting the pixel values to </a:t>
+            </a:r>
+            <a:r>
+              <a:rPr lang="en-US" b="1" i="1" dirty="0"/>
+              <a:t>Hounsfield Units (HU)</a:t>
+            </a:r>
+            <a:r>
+              <a:rPr lang="en-US" dirty="0"/>
+              <a:t>, and what tissue these unit values correspond to</a:t>
+            </a:r>
+          </a:p>
+          <a:p>
+            <a:pPr lvl="1"/>
+            <a:r>
+              <a:rPr lang="en-US" b="1" dirty="0"/>
+              <a:t>Resampling</a:t>
+            </a:r>
+            <a:r>
+              <a:rPr lang="en-US" dirty="0"/>
+              <a:t> to an isomorphic resolution to remove variance in scanner resolution.</a:t>
+            </a:r>
+          </a:p>
+          <a:p>
+            <a:pPr lvl="1"/>
+            <a:r>
+              <a:rPr lang="en-US" b="1" dirty="0"/>
+              <a:t>3D plotting</a:t>
+            </a:r>
+            <a:r>
+              <a:rPr lang="en-US" dirty="0"/>
+              <a:t>, visualization is very useful to see what we are doing.</a:t>
+            </a:r>
+          </a:p>
+          <a:p>
+            <a:pPr lvl="1"/>
+            <a:r>
+              <a:rPr lang="en-US" b="1" dirty="0"/>
+              <a:t>Lung segmentation</a:t>
+            </a:r>
+            <a:endParaRPr lang="en-US" dirty="0"/>
+          </a:p>
+          <a:p>
+            <a:pPr lvl="1"/>
+            <a:r>
+              <a:rPr lang="en-US" b="1" dirty="0"/>
+              <a:t>Normalization</a:t>
+            </a:r>
+            <a:r>
+              <a:rPr lang="en-US" dirty="0"/>
+              <a:t> that makes sense.</a:t>
+            </a:r>
+          </a:p>
+          <a:p>
+            <a:pPr lvl="1"/>
+            <a:r>
+              <a:rPr lang="en-US" b="1" dirty="0"/>
+              <a:t>Zero centering</a:t>
+            </a:r>
+            <a:r>
+              <a:rPr lang="en-US" dirty="0"/>
+              <a:t> the scans.</a:t>
+            </a:r>
+          </a:p>
+          <a:p>
+            <a:pPr lvl="1"/>
+            <a:endParaRPr lang="en-US" dirty="0">
+              <a:sym typeface="Wingdings" panose="05000000000000000000" pitchFamily="2" charset="2"/>
+            </a:endParaRPr>
+          </a:p>
+          <a:p>
+            <a:pPr lvl="1"/>
+            <a:endParaRPr lang="en-US" dirty="0"/>
+          </a:p>
+        </p:txBody>
+      </p:sp>
+      <p:pic>
+        <p:nvPicPr>
+          <p:cNvPr id="4" name="Picture 3"/>
+          <p:cNvPicPr>
+            <a:picLocks noChangeAspect="1"/>
+          </p:cNvPicPr>
+          <p:nvPr/>
+        </p:nvPicPr>
+        <p:blipFill>
+          <a:blip r:embed="rId2"/>
+          <a:stretch>
+            <a:fillRect/>
+          </a:stretch>
+        </p:blipFill>
+        <p:spPr>
+          <a:xfrm>
+            <a:off x="8021052" y="2709779"/>
+            <a:ext cx="3972370" cy="3504532"/>
+          </a:xfrm>
+          <a:prstGeom prst="rect">
+            <a:avLst/>
+          </a:prstGeom>
+        </p:spPr>
+      </p:pic>
+    </p:spTree>
+    <p:extLst>
+      <p:ext uri="{BB962C8B-B14F-4D97-AF65-F5344CB8AC3E}">
+        <p14:creationId xmlns:p14="http://schemas.microsoft.com/office/powerpoint/2010/main" val="967795767"/>
+      </p:ext>
+    </p:extLst>
+  </p:cSld>
+  <p:clrMapOvr>
+    <a:masterClrMapping/>
+  </p:clrMapOvr>
+</p:sld>
+</file>
+
+<file path=ppt/slides/slide7.xml><?xml version="1.0" encoding="utf-8"?>
+<p:sld xmlns:a="http://schemas.openxmlformats.org/drawingml/2006/main" xmlns:r="http://schemas.openxmlformats.org/officeDocument/2006/relationships" xmlns:p="http://schemas.openxmlformats.org/presentationml/2006/main">
+  <p:cSld>
+    <p:spTree>
+      <p:nvGrpSpPr>
+        <p:cNvPr id="1" name=""/>
+        <p:cNvGrpSpPr/>
+        <p:nvPr/>
+      </p:nvGrpSpPr>
+      <p:grpSpPr>
+        <a:xfrm>
+          <a:off x="0" y="0"/>
+          <a:ext cx="0" cy="0"/>
+          <a:chOff x="0" y="0"/>
+          <a:chExt cx="0" cy="0"/>
+        </a:xfrm>
+      </p:grpSpPr>
+      <p:sp>
+        <p:nvSpPr>
+          <p:cNvPr id="2" name="Title 1"/>
+          <p:cNvSpPr>
+            <a:spLocks noGrp="1"/>
+          </p:cNvSpPr>
+          <p:nvPr>
+            <p:ph type="title"/>
+          </p:nvPr>
+        </p:nvSpPr>
+        <p:spPr/>
+        <p:txBody>
+          <a:bodyPr/>
+          <a:lstStyle/>
+          <a:p>
+            <a:r>
+              <a:rPr lang="en-US" dirty="0"/>
+              <a:t>Lung Segmentation</a:t>
+            </a:r>
+          </a:p>
+        </p:txBody>
+      </p:sp>
+      <p:pic>
+        <p:nvPicPr>
+          <p:cNvPr id="4" name="Picture 3"/>
+          <p:cNvPicPr>
+            <a:picLocks noChangeAspect="1"/>
+          </p:cNvPicPr>
+          <p:nvPr/>
+        </p:nvPicPr>
+        <p:blipFill>
+          <a:blip r:embed="rId2"/>
+          <a:stretch>
+            <a:fillRect/>
+          </a:stretch>
+        </p:blipFill>
+        <p:spPr>
+          <a:xfrm>
+            <a:off x="218570" y="2983831"/>
+            <a:ext cx="2979323" cy="3018673"/>
+          </a:xfrm>
+          <a:prstGeom prst="rect">
+            <a:avLst/>
+          </a:prstGeom>
+        </p:spPr>
+      </p:pic>
+      <p:sp>
+        <p:nvSpPr>
+          <p:cNvPr id="5" name="TextBox 4"/>
+          <p:cNvSpPr txBox="1"/>
+          <p:nvPr/>
+        </p:nvSpPr>
+        <p:spPr>
+          <a:xfrm>
+            <a:off x="3197893" y="2383666"/>
+            <a:ext cx="3202907" cy="923330"/>
+          </a:xfrm>
+          <a:prstGeom prst="rect">
+            <a:avLst/>
+          </a:prstGeom>
+          <a:noFill/>
+        </p:spPr>
+        <p:txBody>
+          <a:bodyPr wrap="square" rtlCol="0">
+            <a:spAutoFit/>
+          </a:bodyPr>
+          <a:lstStyle/>
+          <a:p>
+            <a:pPr algn="ctr"/>
+            <a:r>
+              <a:rPr lang="en-US" dirty="0"/>
+              <a:t>Segmented Lung Mask</a:t>
+            </a:r>
+          </a:p>
+          <a:p>
+            <a:pPr algn="ctr"/>
+            <a:r>
+              <a:rPr lang="en-US" dirty="0"/>
+              <a:t>Threshold at -320 including structures in the lungs </a:t>
+            </a:r>
+          </a:p>
+        </p:txBody>
+      </p:sp>
+      <p:sp>
+        <p:nvSpPr>
+          <p:cNvPr id="9" name="TextBox 8"/>
+          <p:cNvSpPr txBox="1"/>
+          <p:nvPr/>
+        </p:nvSpPr>
+        <p:spPr>
+          <a:xfrm>
+            <a:off x="581159" y="2542129"/>
+            <a:ext cx="2254143" cy="369332"/>
+          </a:xfrm>
+          <a:prstGeom prst="rect">
+            <a:avLst/>
+          </a:prstGeom>
+          <a:noFill/>
+        </p:spPr>
+        <p:txBody>
+          <a:bodyPr wrap="none" rtlCol="0">
+            <a:spAutoFit/>
+          </a:bodyPr>
+          <a:lstStyle/>
+          <a:p>
+            <a:r>
+              <a:rPr lang="en-US" dirty="0"/>
+              <a:t>Just bones ~400HU</a:t>
+            </a:r>
+          </a:p>
+        </p:txBody>
+      </p:sp>
+      <p:pic>
+        <p:nvPicPr>
+          <p:cNvPr id="11" name="Picture 10"/>
+          <p:cNvPicPr>
+            <a:picLocks noChangeAspect="1"/>
+          </p:cNvPicPr>
+          <p:nvPr/>
+        </p:nvPicPr>
+        <p:blipFill>
+          <a:blip r:embed="rId3"/>
+          <a:stretch>
+            <a:fillRect/>
+          </a:stretch>
+        </p:blipFill>
+        <p:spPr>
+          <a:xfrm>
+            <a:off x="3383129" y="3306996"/>
+            <a:ext cx="2832434" cy="2875678"/>
+          </a:xfrm>
+          <a:prstGeom prst="rect">
+            <a:avLst/>
+          </a:prstGeom>
+        </p:spPr>
+      </p:pic>
+      <p:sp>
+        <p:nvSpPr>
+          <p:cNvPr id="12" name="TextBox 11"/>
+          <p:cNvSpPr txBox="1"/>
+          <p:nvPr/>
+        </p:nvSpPr>
+        <p:spPr>
+          <a:xfrm>
+            <a:off x="6763392" y="2983830"/>
+            <a:ext cx="5091724" cy="3970318"/>
+          </a:xfrm>
+          <a:prstGeom prst="rect">
+            <a:avLst/>
+          </a:prstGeom>
+          <a:noFill/>
+        </p:spPr>
+        <p:txBody>
+          <a:bodyPr wrap="square" rtlCol="0">
+            <a:spAutoFit/>
+          </a:bodyPr>
+          <a:lstStyle/>
+          <a:p>
+            <a:r>
+              <a:rPr lang="en-US" dirty="0"/>
+              <a:t>1. Apply morphological function to expand mask in all directions</a:t>
+            </a:r>
+          </a:p>
+          <a:p>
+            <a:r>
+              <a:rPr lang="en-US" dirty="0"/>
+              <a:t>2. Multiply  binary segmented lung mask time the full resampled image</a:t>
+            </a:r>
+          </a:p>
+          <a:p>
+            <a:r>
+              <a:rPr lang="en-US" dirty="0"/>
+              <a:t>3. This leaves you just the lungs!</a:t>
+            </a:r>
+          </a:p>
+          <a:p>
+            <a:endParaRPr lang="en-US" dirty="0"/>
+          </a:p>
+          <a:p>
+            <a:r>
+              <a:rPr lang="en-US" dirty="0"/>
+              <a:t>Then run this new data set with just the lungs through the original process.  Rinse and Repeat with new data, new choices, new experiments </a:t>
+            </a:r>
+          </a:p>
+          <a:p>
+            <a:endParaRPr lang="en-US" dirty="0">
+              <a:sym typeface="Wingdings" panose="05000000000000000000" pitchFamily="2" charset="2"/>
+            </a:endParaRPr>
+          </a:p>
+          <a:p>
+            <a:r>
+              <a:rPr lang="en-US" dirty="0">
+                <a:sym typeface="Wingdings" panose="05000000000000000000" pitchFamily="2" charset="2"/>
+              </a:rPr>
+              <a:t>Last step, submit work, get paid, drink beer </a:t>
+            </a:r>
+          </a:p>
+          <a:p>
+            <a:endParaRPr lang="en-US" dirty="0"/>
+          </a:p>
+        </p:txBody>
+      </p:sp>
+    </p:spTree>
+    <p:extLst>
+      <p:ext uri="{BB962C8B-B14F-4D97-AF65-F5344CB8AC3E}">
+        <p14:creationId xmlns:p14="http://schemas.microsoft.com/office/powerpoint/2010/main" val="1120395256"/>
+      </p:ext>
+    </p:extLst>
+  </p:cSld>
+  <p:clrMapOvr>
+    <a:masterClrMapping/>
+  </p:clrMapOvr>
+</p:sld>
+</file>
+
 <file path=ppt/theme/theme1.xml><?xml version="1.0" encoding="utf-8"?>
 <a:theme xmlns:a="http://schemas.openxmlformats.org/drawingml/2006/main" name="Ion Boardroom">
   <a:themeElements>

</xml_diff>